<commit_message>
Adding DRAFT Use Case
</commit_message>
<xml_diff>
--- a/US-PCS ballot images 2026.pptx
+++ b/US-PCS ballot images 2026.pptx
@@ -6,12 +6,13 @@
     <p:sldMasterId id="2147483670" r:id="rId2"/>
   </p:sldMasterIdLst>
   <p:notesMasterIdLst>
-    <p:notesMasterId r:id="rId6"/>
+    <p:notesMasterId r:id="rId7"/>
   </p:notesMasterIdLst>
   <p:sldIdLst>
     <p:sldId id="801" r:id="rId3"/>
     <p:sldId id="258" r:id="rId4"/>
     <p:sldId id="802" r:id="rId5"/>
+    <p:sldId id="803" r:id="rId6"/>
   </p:sldIdLst>
   <p:sldSz cx="9144000" cy="6858000" type="screen4x3"/>
   <p:notesSz cx="6858000" cy="9144000"/>
@@ -118,6 +119,7 @@
             <p14:sldId id="801"/>
             <p14:sldId id="258"/>
             <p14:sldId id="802"/>
+            <p14:sldId id="803"/>
           </p14:sldIdLst>
         </p14:section>
       </p14:sectionLst>
@@ -130,6 +132,16 @@
           </p15:clr>
         </p15:guide>
         <p15:guide id="2" pos="2880">
+          <p15:clr>
+            <a:srgbClr val="A4A3A4"/>
+          </p15:clr>
+        </p15:guide>
+        <p15:guide id="3" orient="horz" pos="2795" userDrawn="1">
+          <p15:clr>
+            <a:srgbClr val="A4A3A4"/>
+          </p15:clr>
+        </p15:guide>
+        <p15:guide id="4" orient="horz" pos="1525" userDrawn="1">
           <p15:clr>
             <a:srgbClr val="A4A3A4"/>
           </p15:clr>
@@ -847,7 +859,7 @@
           <a:p>
             <a:fld id="{10B9A41D-2C14-4FD9-A8FE-469DBFAB3809}" type="datetimeFigureOut">
               <a:rPr lang="en-CA" smtClean="0"/>
-              <a:t>2026-02-09</a:t>
+              <a:t>2026-02-16</a:t>
             </a:fld>
             <a:endParaRPr lang="en-CA" dirty="0"/>
           </a:p>
@@ -1699,7 +1711,7 @@
           <a:p>
             <a:fld id="{0D2F0FE0-C0B2-431B-95AF-3256C55C95DF}" type="datetimeFigureOut">
               <a:rPr lang="en-US" smtClean="0"/>
-              <a:t>2/9/2026</a:t>
+              <a:t>2/16/2026</a:t>
             </a:fld>
             <a:endParaRPr lang="en-US"/>
           </a:p>
@@ -1897,7 +1909,7 @@
           <a:p>
             <a:fld id="{0D2F0FE0-C0B2-431B-95AF-3256C55C95DF}" type="datetimeFigureOut">
               <a:rPr lang="en-US" smtClean="0"/>
-              <a:t>2/9/2026</a:t>
+              <a:t>2/16/2026</a:t>
             </a:fld>
             <a:endParaRPr lang="en-US"/>
           </a:p>
@@ -2172,7 +2184,7 @@
           <a:p>
             <a:fld id="{0D2F0FE0-C0B2-431B-95AF-3256C55C95DF}" type="datetimeFigureOut">
               <a:rPr lang="en-US" smtClean="0"/>
-              <a:t>2/9/2026</a:t>
+              <a:t>2/16/2026</a:t>
             </a:fld>
             <a:endParaRPr lang="en-US"/>
           </a:p>
@@ -2437,7 +2449,7 @@
           <a:p>
             <a:fld id="{0D2F0FE0-C0B2-431B-95AF-3256C55C95DF}" type="datetimeFigureOut">
               <a:rPr lang="en-US" smtClean="0"/>
-              <a:t>2/9/2026</a:t>
+              <a:t>2/16/2026</a:t>
             </a:fld>
             <a:endParaRPr lang="en-US"/>
           </a:p>
@@ -2849,7 +2861,7 @@
           <a:p>
             <a:fld id="{0D2F0FE0-C0B2-431B-95AF-3256C55C95DF}" type="datetimeFigureOut">
               <a:rPr lang="en-US" smtClean="0"/>
-              <a:t>2/9/2026</a:t>
+              <a:t>2/16/2026</a:t>
             </a:fld>
             <a:endParaRPr lang="en-US"/>
           </a:p>
@@ -2990,7 +3002,7 @@
           <a:p>
             <a:fld id="{0D2F0FE0-C0B2-431B-95AF-3256C55C95DF}" type="datetimeFigureOut">
               <a:rPr lang="en-US" smtClean="0"/>
-              <a:t>2/9/2026</a:t>
+              <a:t>2/16/2026</a:t>
             </a:fld>
             <a:endParaRPr lang="en-US"/>
           </a:p>
@@ -3103,7 +3115,7 @@
           <a:p>
             <a:fld id="{0D2F0FE0-C0B2-431B-95AF-3256C55C95DF}" type="datetimeFigureOut">
               <a:rPr lang="en-US" smtClean="0"/>
-              <a:t>2/9/2026</a:t>
+              <a:t>2/16/2026</a:t>
             </a:fld>
             <a:endParaRPr lang="en-US"/>
           </a:p>
@@ -3414,7 +3426,7 @@
           <a:p>
             <a:fld id="{0D2F0FE0-C0B2-431B-95AF-3256C55C95DF}" type="datetimeFigureOut">
               <a:rPr lang="en-US" smtClean="0"/>
-              <a:t>2/9/2026</a:t>
+              <a:t>2/16/2026</a:t>
             </a:fld>
             <a:endParaRPr lang="en-US"/>
           </a:p>
@@ -3702,7 +3714,7 @@
           <a:p>
             <a:fld id="{0D2F0FE0-C0B2-431B-95AF-3256C55C95DF}" type="datetimeFigureOut">
               <a:rPr lang="en-US" smtClean="0"/>
-              <a:t>2/9/2026</a:t>
+              <a:t>2/16/2026</a:t>
             </a:fld>
             <a:endParaRPr lang="en-US"/>
           </a:p>
@@ -3900,7 +3912,7 @@
           <a:p>
             <a:fld id="{0D2F0FE0-C0B2-431B-95AF-3256C55C95DF}" type="datetimeFigureOut">
               <a:rPr lang="en-US" smtClean="0"/>
-              <a:t>2/9/2026</a:t>
+              <a:t>2/16/2026</a:t>
             </a:fld>
             <a:endParaRPr lang="en-US"/>
           </a:p>
@@ -4351,7 +4363,7 @@
           <a:p>
             <a:fld id="{0D2F0FE0-C0B2-431B-95AF-3256C55C95DF}" type="datetimeFigureOut">
               <a:rPr lang="en-US" smtClean="0"/>
-              <a:t>2/9/2026</a:t>
+              <a:t>2/16/2026</a:t>
             </a:fld>
             <a:endParaRPr lang="en-US"/>
           </a:p>
@@ -7933,7 +7945,7 @@
           <a:p>
             <a:fld id="{0D2F0FE0-C0B2-431B-95AF-3256C55C95DF}" type="datetimeFigureOut">
               <a:rPr lang="en-US" smtClean="0"/>
-              <a:t>2/9/2026</a:t>
+              <a:t>2/16/2026</a:t>
             </a:fld>
             <a:endParaRPr lang="en-US"/>
           </a:p>
@@ -15677,6 +15689,666 @@
     <p:extLst>
       <p:ext uri="{BB962C8B-B14F-4D97-AF65-F5344CB8AC3E}">
         <p14:creationId xmlns:p14="http://schemas.microsoft.com/office/powerpoint/2010/main" val="3279110075"/>
+      </p:ext>
+    </p:extLst>
+  </p:cSld>
+  <p:clrMapOvr>
+    <a:masterClrMapping/>
+  </p:clrMapOvr>
+</p:sld>
+</file>
+
+<file path=ppt/slides/slide4.xml><?xml version="1.0" encoding="utf-8"?>
+<p:sld xmlns:a="http://schemas.openxmlformats.org/drawingml/2006/main" xmlns:r="http://schemas.openxmlformats.org/officeDocument/2006/relationships" xmlns:p="http://schemas.openxmlformats.org/presentationml/2006/main">
+  <p:cSld>
+    <p:spTree>
+      <p:nvGrpSpPr>
+        <p:cNvPr id="1" name=""/>
+        <p:cNvGrpSpPr/>
+        <p:nvPr/>
+      </p:nvGrpSpPr>
+      <p:grpSpPr>
+        <a:xfrm>
+          <a:off x="0" y="0"/>
+          <a:ext cx="0" cy="0"/>
+          <a:chOff x="0" y="0"/>
+          <a:chExt cx="0" cy="0"/>
+        </a:xfrm>
+      </p:grpSpPr>
+      <p:pic>
+        <p:nvPicPr>
+          <p:cNvPr id="43" name="Picture 42">
+            <a:extLst>
+              <a:ext uri="{FF2B5EF4-FFF2-40B4-BE49-F238E27FC236}">
+                <a16:creationId xmlns:a16="http://schemas.microsoft.com/office/drawing/2014/main" id="{0942FD49-C10A-7F86-0182-01018D0A8A55}"/>
+              </a:ext>
+            </a:extLst>
+          </p:cNvPr>
+          <p:cNvPicPr>
+            <a:picLocks noChangeAspect="1"/>
+          </p:cNvPicPr>
+          <p:nvPr/>
+        </p:nvPicPr>
+        <p:blipFill>
+          <a:blip r:embed="rId2"/>
+          <a:srcRect l="21448" t="17026" r="23535" b="23626"/>
+          <a:stretch>
+            <a:fillRect/>
+          </a:stretch>
+        </p:blipFill>
+        <p:spPr>
+          <a:xfrm>
+            <a:off x="693616" y="2591485"/>
+            <a:ext cx="1267858" cy="1393017"/>
+          </a:xfrm>
+          <a:prstGeom prst="rect">
+            <a:avLst/>
+          </a:prstGeom>
+        </p:spPr>
+      </p:pic>
+      <p:pic>
+        <p:nvPicPr>
+          <p:cNvPr id="1026" name="Picture 2" descr="logo fhir">
+            <a:extLst>
+              <a:ext uri="{FF2B5EF4-FFF2-40B4-BE49-F238E27FC236}">
+                <a16:creationId xmlns:a16="http://schemas.microsoft.com/office/drawing/2014/main" id="{0FBADC46-2EBA-4767-F677-9F9DCE589E0E}"/>
+              </a:ext>
+            </a:extLst>
+          </p:cNvPr>
+          <p:cNvPicPr>
+            <a:picLocks noChangeAspect="1" noChangeArrowheads="1"/>
+          </p:cNvPicPr>
+          <p:nvPr/>
+        </p:nvPicPr>
+        <p:blipFill rotWithShape="1">
+          <a:blip r:embed="rId3">
+            <a:extLst>
+              <a:ext uri="{28A0092B-C50C-407E-A947-70E740481C1C}">
+                <a14:useLocalDpi xmlns:a14="http://schemas.microsoft.com/office/drawing/2010/main" val="0"/>
+              </a:ext>
+            </a:extLst>
+          </a:blip>
+          <a:srcRect r="83546"/>
+          <a:stretch>
+            <a:fillRect/>
+          </a:stretch>
+        </p:blipFill>
+        <p:spPr bwMode="auto">
+          <a:xfrm>
+            <a:off x="677389" y="2301737"/>
+            <a:ext cx="576064" cy="843376"/>
+          </a:xfrm>
+          <a:prstGeom prst="rect">
+            <a:avLst/>
+          </a:prstGeom>
+          <a:noFill/>
+          <a:extLst>
+            <a:ext uri="{909E8E84-426E-40DD-AFC4-6F175D3DCCD1}">
+              <a14:hiddenFill xmlns:a14="http://schemas.microsoft.com/office/drawing/2010/main">
+                <a:solidFill>
+                  <a:srgbClr val="FFFFFF"/>
+                </a:solidFill>
+              </a14:hiddenFill>
+            </a:ext>
+          </a:extLst>
+        </p:spPr>
+      </p:pic>
+      <p:sp>
+        <p:nvSpPr>
+          <p:cNvPr id="12" name="TextBox 11">
+            <a:extLst>
+              <a:ext uri="{FF2B5EF4-FFF2-40B4-BE49-F238E27FC236}">
+                <a16:creationId xmlns:a16="http://schemas.microsoft.com/office/drawing/2014/main" id="{64C0AE77-9580-EE6F-7BC5-7ECDB413B929}"/>
+              </a:ext>
+            </a:extLst>
+          </p:cNvPr>
+          <p:cNvSpPr txBox="1"/>
+          <p:nvPr/>
+        </p:nvSpPr>
+        <p:spPr>
+          <a:xfrm>
+            <a:off x="278644" y="3933056"/>
+            <a:ext cx="2068195" cy="954107"/>
+          </a:xfrm>
+          <a:prstGeom prst="rect">
+            <a:avLst/>
+          </a:prstGeom>
+          <a:noFill/>
+        </p:spPr>
+        <p:txBody>
+          <a:bodyPr wrap="none" rtlCol="0">
+            <a:spAutoFit/>
+          </a:bodyPr>
+          <a:lstStyle/>
+          <a:p>
+            <a:pPr algn="ctr"/>
+            <a:r>
+              <a:rPr lang="en-US" sz="2800" b="1" dirty="0"/>
+              <a:t>US-PCS</a:t>
+            </a:r>
+          </a:p>
+          <a:p>
+            <a:pPr algn="ctr"/>
+            <a:r>
+              <a:rPr lang="en-US" sz="2800" b="1" dirty="0"/>
+              <a:t>Document*</a:t>
+            </a:r>
+          </a:p>
+        </p:txBody>
+      </p:sp>
+      <p:sp>
+        <p:nvSpPr>
+          <p:cNvPr id="13" name="Arrow: Right 12">
+            <a:extLst>
+              <a:ext uri="{FF2B5EF4-FFF2-40B4-BE49-F238E27FC236}">
+                <a16:creationId xmlns:a16="http://schemas.microsoft.com/office/drawing/2014/main" id="{90F116CE-6A2A-17EA-BE84-B3BDF6FB9DE8}"/>
+              </a:ext>
+            </a:extLst>
+          </p:cNvPr>
+          <p:cNvSpPr/>
+          <p:nvPr/>
+        </p:nvSpPr>
+        <p:spPr>
+          <a:xfrm>
+            <a:off x="2105472" y="3145113"/>
+            <a:ext cx="782058" cy="524776"/>
+          </a:xfrm>
+          <a:prstGeom prst="rightArrow">
+            <a:avLst/>
+          </a:prstGeom>
+          <a:solidFill>
+            <a:srgbClr val="00B0F0"/>
+          </a:solidFill>
+          <a:ln>
+            <a:noFill/>
+          </a:ln>
+        </p:spPr>
+        <p:style>
+          <a:lnRef idx="2">
+            <a:schemeClr val="accent1">
+              <a:shade val="15000"/>
+            </a:schemeClr>
+          </a:lnRef>
+          <a:fillRef idx="1">
+            <a:schemeClr val="accent1"/>
+          </a:fillRef>
+          <a:effectRef idx="0">
+            <a:schemeClr val="accent1"/>
+          </a:effectRef>
+          <a:fontRef idx="minor">
+            <a:schemeClr val="lt1"/>
+          </a:fontRef>
+        </p:style>
+        <p:txBody>
+          <a:bodyPr rtlCol="0" anchor="ctr"/>
+          <a:lstStyle/>
+          <a:p>
+            <a:pPr algn="ctr" defTabSz="685800"/>
+            <a:endParaRPr lang="en-US">
+              <a:solidFill>
+                <a:prstClr val="black"/>
+              </a:solidFill>
+              <a:latin typeface="Aptos" panose="02110004020202020204"/>
+            </a:endParaRPr>
+          </a:p>
+        </p:txBody>
+      </p:sp>
+      <p:sp>
+        <p:nvSpPr>
+          <p:cNvPr id="14" name="TextBox 13">
+            <a:extLst>
+              <a:ext uri="{FF2B5EF4-FFF2-40B4-BE49-F238E27FC236}">
+                <a16:creationId xmlns:a16="http://schemas.microsoft.com/office/drawing/2014/main" id="{8D28B91B-17DF-D1E4-E176-ECAC8EBE8ADC}"/>
+              </a:ext>
+            </a:extLst>
+          </p:cNvPr>
+          <p:cNvSpPr txBox="1"/>
+          <p:nvPr/>
+        </p:nvSpPr>
+        <p:spPr>
+          <a:xfrm>
+            <a:off x="2581428" y="3933056"/>
+            <a:ext cx="2240165" cy="954107"/>
+          </a:xfrm>
+          <a:prstGeom prst="rect">
+            <a:avLst/>
+          </a:prstGeom>
+          <a:noFill/>
+        </p:spPr>
+        <p:txBody>
+          <a:bodyPr wrap="none" rtlCol="0">
+            <a:spAutoFit/>
+          </a:bodyPr>
+          <a:lstStyle/>
+          <a:p>
+            <a:pPr algn="ctr"/>
+            <a:r>
+              <a:rPr lang="en-US" sz="2800" b="1" dirty="0"/>
+              <a:t>Clinician</a:t>
+            </a:r>
+            <a:br>
+              <a:rPr lang="en-US" sz="2800" b="1" dirty="0"/>
+            </a:br>
+            <a:r>
+              <a:rPr lang="en-US" sz="2800" b="1" dirty="0"/>
+              <a:t>or Caregiver </a:t>
+            </a:r>
+          </a:p>
+        </p:txBody>
+      </p:sp>
+      <p:sp>
+        <p:nvSpPr>
+          <p:cNvPr id="15" name="TextBox 14">
+            <a:extLst>
+              <a:ext uri="{FF2B5EF4-FFF2-40B4-BE49-F238E27FC236}">
+                <a16:creationId xmlns:a16="http://schemas.microsoft.com/office/drawing/2014/main" id="{ED23158F-9128-0415-912D-E82E93CC48E3}"/>
+              </a:ext>
+            </a:extLst>
+          </p:cNvPr>
+          <p:cNvSpPr txBox="1"/>
+          <p:nvPr/>
+        </p:nvSpPr>
+        <p:spPr>
+          <a:xfrm>
+            <a:off x="5292081" y="719688"/>
+            <a:ext cx="3851919" cy="954107"/>
+          </a:xfrm>
+          <a:prstGeom prst="rect">
+            <a:avLst/>
+          </a:prstGeom>
+          <a:noFill/>
+        </p:spPr>
+        <p:txBody>
+          <a:bodyPr wrap="square" rtlCol="0">
+            <a:spAutoFit/>
+          </a:bodyPr>
+          <a:lstStyle/>
+          <a:p>
+            <a:pPr algn="ctr"/>
+            <a:r>
+              <a:rPr lang="en-US" sz="2800" b="1" dirty="0"/>
+              <a:t>How to Request </a:t>
+            </a:r>
+            <a:br>
+              <a:rPr lang="en-US" sz="2800" b="1" dirty="0"/>
+            </a:br>
+            <a:r>
+              <a:rPr lang="en-US" sz="2800" b="1" dirty="0"/>
+              <a:t>Additional Data?</a:t>
+            </a:r>
+          </a:p>
+        </p:txBody>
+      </p:sp>
+      <p:pic>
+        <p:nvPicPr>
+          <p:cNvPr id="16" name="Picture 2" descr="logo fhir">
+            <a:extLst>
+              <a:ext uri="{FF2B5EF4-FFF2-40B4-BE49-F238E27FC236}">
+                <a16:creationId xmlns:a16="http://schemas.microsoft.com/office/drawing/2014/main" id="{F7ACDBE7-003D-F83F-904C-48A6640FBE21}"/>
+              </a:ext>
+            </a:extLst>
+          </p:cNvPr>
+          <p:cNvPicPr>
+            <a:picLocks noChangeAspect="1" noChangeArrowheads="1"/>
+          </p:cNvPicPr>
+          <p:nvPr/>
+        </p:nvPicPr>
+        <p:blipFill rotWithShape="1">
+          <a:blip r:embed="rId3">
+            <a:extLst>
+              <a:ext uri="{28A0092B-C50C-407E-A947-70E740481C1C}">
+                <a14:useLocalDpi xmlns:a14="http://schemas.microsoft.com/office/drawing/2010/main" val="0"/>
+              </a:ext>
+            </a:extLst>
+          </a:blip>
+          <a:srcRect r="83546"/>
+          <a:stretch>
+            <a:fillRect/>
+          </a:stretch>
+        </p:blipFill>
+        <p:spPr bwMode="auto">
+          <a:xfrm>
+            <a:off x="6001983" y="1994536"/>
+            <a:ext cx="576064" cy="843376"/>
+          </a:xfrm>
+          <a:prstGeom prst="rect">
+            <a:avLst/>
+          </a:prstGeom>
+          <a:noFill/>
+          <a:extLst>
+            <a:ext uri="{909E8E84-426E-40DD-AFC4-6F175D3DCCD1}">
+              <a14:hiddenFill xmlns:a14="http://schemas.microsoft.com/office/drawing/2010/main">
+                <a:solidFill>
+                  <a:srgbClr val="FFFFFF"/>
+                </a:solidFill>
+              </a14:hiddenFill>
+            </a:ext>
+          </a:extLst>
+        </p:spPr>
+      </p:pic>
+      <p:cxnSp>
+        <p:nvCxnSpPr>
+          <p:cNvPr id="18" name="Connector: Elbow 17">
+            <a:extLst>
+              <a:ext uri="{FF2B5EF4-FFF2-40B4-BE49-F238E27FC236}">
+                <a16:creationId xmlns:a16="http://schemas.microsoft.com/office/drawing/2014/main" id="{2CC89D72-0932-AFA5-F38E-FBC780D8C064}"/>
+              </a:ext>
+            </a:extLst>
+          </p:cNvPr>
+          <p:cNvCxnSpPr>
+            <a:cxnSpLocks/>
+            <a:stCxn id="42" idx="3"/>
+            <a:endCxn id="25" idx="1"/>
+          </p:cNvCxnSpPr>
+          <p:nvPr/>
+        </p:nvCxnSpPr>
+        <p:spPr>
+          <a:xfrm flipV="1">
+            <a:off x="4373404" y="2416224"/>
+            <a:ext cx="1540515" cy="978154"/>
+          </a:xfrm>
+          <a:prstGeom prst="bentConnector3">
+            <a:avLst/>
+          </a:prstGeom>
+          <a:ln w="76200">
+            <a:solidFill>
+              <a:srgbClr val="00B0F0"/>
+            </a:solidFill>
+            <a:tailEnd type="triangle"/>
+          </a:ln>
+        </p:spPr>
+        <p:style>
+          <a:lnRef idx="2">
+            <a:schemeClr val="accent1"/>
+          </a:lnRef>
+          <a:fillRef idx="0">
+            <a:schemeClr val="accent1"/>
+          </a:fillRef>
+          <a:effectRef idx="1">
+            <a:schemeClr val="accent1"/>
+          </a:effectRef>
+          <a:fontRef idx="minor">
+            <a:schemeClr val="tx1"/>
+          </a:fontRef>
+        </p:style>
+      </p:cxnSp>
+      <p:sp>
+        <p:nvSpPr>
+          <p:cNvPr id="19" name="TextBox 18">
+            <a:extLst>
+              <a:ext uri="{FF2B5EF4-FFF2-40B4-BE49-F238E27FC236}">
+                <a16:creationId xmlns:a16="http://schemas.microsoft.com/office/drawing/2014/main" id="{AB7BD74B-DBC6-97A8-5720-9281EB4A1E95}"/>
+              </a:ext>
+            </a:extLst>
+          </p:cNvPr>
+          <p:cNvSpPr txBox="1"/>
+          <p:nvPr/>
+        </p:nvSpPr>
+        <p:spPr>
+          <a:xfrm>
+            <a:off x="6876256" y="1824485"/>
+            <a:ext cx="2000799" cy="1183478"/>
+          </a:xfrm>
+          <a:prstGeom prst="rect">
+            <a:avLst/>
+          </a:prstGeom>
+          <a:noFill/>
+        </p:spPr>
+        <p:txBody>
+          <a:bodyPr wrap="square" rtlCol="0">
+            <a:noAutofit/>
+          </a:bodyPr>
+          <a:lstStyle/>
+          <a:p>
+            <a:pPr algn="ctr"/>
+            <a:r>
+              <a:rPr lang="en-US" sz="1600" b="1" dirty="0"/>
+              <a:t>Use FHIR endpoints from US-PCS to query US Core FHIR Servers  </a:t>
+            </a:r>
+          </a:p>
+        </p:txBody>
+      </p:sp>
+      <p:cxnSp>
+        <p:nvCxnSpPr>
+          <p:cNvPr id="20" name="Connector: Elbow 19">
+            <a:extLst>
+              <a:ext uri="{FF2B5EF4-FFF2-40B4-BE49-F238E27FC236}">
+                <a16:creationId xmlns:a16="http://schemas.microsoft.com/office/drawing/2014/main" id="{96515556-E18A-C873-544E-79BF7FF75AD0}"/>
+              </a:ext>
+            </a:extLst>
+          </p:cNvPr>
+          <p:cNvCxnSpPr>
+            <a:cxnSpLocks/>
+            <a:stCxn id="42" idx="3"/>
+            <a:endCxn id="39" idx="1"/>
+          </p:cNvCxnSpPr>
+          <p:nvPr/>
+        </p:nvCxnSpPr>
+        <p:spPr>
+          <a:xfrm>
+            <a:off x="4373404" y="3394378"/>
+            <a:ext cx="1540515" cy="1047328"/>
+          </a:xfrm>
+          <a:prstGeom prst="bentConnector3">
+            <a:avLst/>
+          </a:prstGeom>
+          <a:ln w="76200">
+            <a:solidFill>
+              <a:srgbClr val="00B0F0"/>
+            </a:solidFill>
+            <a:tailEnd type="triangle"/>
+          </a:ln>
+        </p:spPr>
+        <p:style>
+          <a:lnRef idx="2">
+            <a:schemeClr val="accent1"/>
+          </a:lnRef>
+          <a:fillRef idx="0">
+            <a:schemeClr val="accent1"/>
+          </a:fillRef>
+          <a:effectRef idx="1">
+            <a:schemeClr val="accent1"/>
+          </a:effectRef>
+          <a:fontRef idx="minor">
+            <a:schemeClr val="tx1"/>
+          </a:fontRef>
+        </p:style>
+      </p:cxnSp>
+      <p:sp>
+        <p:nvSpPr>
+          <p:cNvPr id="25" name="Rectangle 24">
+            <a:extLst>
+              <a:ext uri="{FF2B5EF4-FFF2-40B4-BE49-F238E27FC236}">
+                <a16:creationId xmlns:a16="http://schemas.microsoft.com/office/drawing/2014/main" id="{28E5FA0A-48AB-9A6C-A148-73CE414E80F3}"/>
+              </a:ext>
+            </a:extLst>
+          </p:cNvPr>
+          <p:cNvSpPr/>
+          <p:nvPr/>
+        </p:nvSpPr>
+        <p:spPr>
+          <a:xfrm>
+            <a:off x="5913919" y="2326468"/>
+            <a:ext cx="179512" cy="179512"/>
+          </a:xfrm>
+          <a:prstGeom prst="rect">
+            <a:avLst/>
+          </a:prstGeom>
+          <a:noFill/>
+          <a:ln>
+            <a:noFill/>
+          </a:ln>
+        </p:spPr>
+        <p:style>
+          <a:lnRef idx="2">
+            <a:schemeClr val="accent1">
+              <a:shade val="15000"/>
+            </a:schemeClr>
+          </a:lnRef>
+          <a:fillRef idx="1">
+            <a:schemeClr val="accent1"/>
+          </a:fillRef>
+          <a:effectRef idx="0">
+            <a:schemeClr val="accent1"/>
+          </a:effectRef>
+          <a:fontRef idx="minor">
+            <a:schemeClr val="lt1"/>
+          </a:fontRef>
+        </p:style>
+        <p:txBody>
+          <a:bodyPr rtlCol="0" anchor="ctr"/>
+          <a:lstStyle/>
+          <a:p>
+            <a:pPr algn="ctr"/>
+            <a:endParaRPr lang="en-US"/>
+          </a:p>
+        </p:txBody>
+      </p:sp>
+      <p:sp>
+        <p:nvSpPr>
+          <p:cNvPr id="27" name="TextBox 26">
+            <a:extLst>
+              <a:ext uri="{FF2B5EF4-FFF2-40B4-BE49-F238E27FC236}">
+                <a16:creationId xmlns:a16="http://schemas.microsoft.com/office/drawing/2014/main" id="{8C3103B2-FDD0-BE4B-3BBF-733BECDDC612}"/>
+              </a:ext>
+            </a:extLst>
+          </p:cNvPr>
+          <p:cNvSpPr txBox="1"/>
+          <p:nvPr/>
+        </p:nvSpPr>
+        <p:spPr>
+          <a:xfrm>
+            <a:off x="6876256" y="3757380"/>
+            <a:ext cx="2000799" cy="1068792"/>
+          </a:xfrm>
+          <a:prstGeom prst="rect">
+            <a:avLst/>
+          </a:prstGeom>
+          <a:noFill/>
+        </p:spPr>
+        <p:txBody>
+          <a:bodyPr wrap="square" rtlCol="0">
+            <a:noAutofit/>
+          </a:bodyPr>
+          <a:lstStyle/>
+          <a:p>
+            <a:pPr algn="ctr"/>
+            <a:r>
+              <a:rPr lang="en-US" sz="1600" b="1" dirty="0"/>
+              <a:t>Use HIEs, EHR Networks or TEFCA QHINs to query for other documents or resources</a:t>
+            </a:r>
+          </a:p>
+        </p:txBody>
+      </p:sp>
+      <p:sp>
+        <p:nvSpPr>
+          <p:cNvPr id="37" name="TextBox 36">
+            <a:extLst>
+              <a:ext uri="{FF2B5EF4-FFF2-40B4-BE49-F238E27FC236}">
+                <a16:creationId xmlns:a16="http://schemas.microsoft.com/office/drawing/2014/main" id="{9BF9A3AC-8A48-66AC-6DC3-8328E38ECACB}"/>
+              </a:ext>
+            </a:extLst>
+          </p:cNvPr>
+          <p:cNvSpPr txBox="1"/>
+          <p:nvPr/>
+        </p:nvSpPr>
+        <p:spPr>
+          <a:xfrm>
+            <a:off x="247756" y="4997032"/>
+            <a:ext cx="4540267" cy="776551"/>
+          </a:xfrm>
+          <a:prstGeom prst="rect">
+            <a:avLst/>
+          </a:prstGeom>
+          <a:noFill/>
+        </p:spPr>
+        <p:txBody>
+          <a:bodyPr wrap="square" rtlCol="0">
+            <a:noAutofit/>
+          </a:bodyPr>
+          <a:lstStyle/>
+          <a:p>
+            <a:pPr algn="ctr"/>
+            <a:r>
+              <a:rPr lang="en-US" sz="1600" b="1" dirty="0">
+                <a:solidFill>
+                  <a:schemeClr val="tx1">
+                    <a:lumMod val="50000"/>
+                    <a:lumOff val="50000"/>
+                  </a:schemeClr>
+                </a:solidFill>
+              </a:rPr>
+              <a:t>* A US-PCS is a FHIR Clinical Document but only requires Problems, Allergies, Medications and key patient/document information. </a:t>
+            </a:r>
+          </a:p>
+        </p:txBody>
+      </p:sp>
+      <p:pic>
+        <p:nvPicPr>
+          <p:cNvPr id="39" name="Picture 38">
+            <a:extLst>
+              <a:ext uri="{FF2B5EF4-FFF2-40B4-BE49-F238E27FC236}">
+                <a16:creationId xmlns:a16="http://schemas.microsoft.com/office/drawing/2014/main" id="{AE13B725-247D-23A9-8356-9116D94EE4F3}"/>
+              </a:ext>
+            </a:extLst>
+          </p:cNvPr>
+          <p:cNvPicPr>
+            <a:picLocks noChangeAspect="1"/>
+          </p:cNvPicPr>
+          <p:nvPr/>
+        </p:nvPicPr>
+        <p:blipFill>
+          <a:blip r:embed="rId4"/>
+          <a:srcRect l="20414" t="20666" r="23960" b="28680"/>
+          <a:stretch>
+            <a:fillRect/>
+          </a:stretch>
+        </p:blipFill>
+        <p:spPr>
+          <a:xfrm>
+            <a:off x="5913919" y="3990837"/>
+            <a:ext cx="1034345" cy="901738"/>
+          </a:xfrm>
+          <a:prstGeom prst="rect">
+            <a:avLst/>
+          </a:prstGeom>
+        </p:spPr>
+      </p:pic>
+      <p:pic>
+        <p:nvPicPr>
+          <p:cNvPr id="42" name="Picture 41">
+            <a:extLst>
+              <a:ext uri="{FF2B5EF4-FFF2-40B4-BE49-F238E27FC236}">
+                <a16:creationId xmlns:a16="http://schemas.microsoft.com/office/drawing/2014/main" id="{F7FC7297-94B6-BE52-EA94-301C913012D6}"/>
+              </a:ext>
+            </a:extLst>
+          </p:cNvPr>
+          <p:cNvPicPr>
+            <a:picLocks noChangeAspect="1"/>
+          </p:cNvPicPr>
+          <p:nvPr/>
+        </p:nvPicPr>
+        <p:blipFill>
+          <a:blip r:embed="rId5"/>
+          <a:srcRect l="23650" t="22046" r="22213" b="29292"/>
+          <a:stretch>
+            <a:fillRect/>
+          </a:stretch>
+        </p:blipFill>
+        <p:spPr>
+          <a:xfrm>
+            <a:off x="3059832" y="2769877"/>
+            <a:ext cx="1313572" cy="1249001"/>
+          </a:xfrm>
+          <a:prstGeom prst="rect">
+            <a:avLst/>
+          </a:prstGeom>
+        </p:spPr>
+      </p:pic>
+    </p:spTree>
+    <p:extLst>
+      <p:ext uri="{BB962C8B-B14F-4D97-AF65-F5344CB8AC3E}">
+        <p14:creationId xmlns:p14="http://schemas.microsoft.com/office/powerpoint/2010/main" val="3098516884"/>
       </p:ext>
     </p:extLst>
   </p:cSld>

</xml_diff>

<commit_message>
Proposing sections for 'Must Support'
</commit_message>
<xml_diff>
--- a/US-PCS ballot images 2026.pptx
+++ b/US-PCS ballot images 2026.pptx
@@ -859,7 +859,7 @@
           <a:p>
             <a:fld id="{10B9A41D-2C14-4FD9-A8FE-469DBFAB3809}" type="datetimeFigureOut">
               <a:rPr lang="en-CA" smtClean="0"/>
-              <a:t>2026-02-16</a:t>
+              <a:t>2026-02-23</a:t>
             </a:fld>
             <a:endParaRPr lang="en-CA" dirty="0"/>
           </a:p>
@@ -1711,7 +1711,7 @@
           <a:p>
             <a:fld id="{0D2F0FE0-C0B2-431B-95AF-3256C55C95DF}" type="datetimeFigureOut">
               <a:rPr lang="en-US" smtClean="0"/>
-              <a:t>2/16/2026</a:t>
+              <a:t>2/23/2026</a:t>
             </a:fld>
             <a:endParaRPr lang="en-US"/>
           </a:p>
@@ -1909,7 +1909,7 @@
           <a:p>
             <a:fld id="{0D2F0FE0-C0B2-431B-95AF-3256C55C95DF}" type="datetimeFigureOut">
               <a:rPr lang="en-US" smtClean="0"/>
-              <a:t>2/16/2026</a:t>
+              <a:t>2/23/2026</a:t>
             </a:fld>
             <a:endParaRPr lang="en-US"/>
           </a:p>
@@ -2184,7 +2184,7 @@
           <a:p>
             <a:fld id="{0D2F0FE0-C0B2-431B-95AF-3256C55C95DF}" type="datetimeFigureOut">
               <a:rPr lang="en-US" smtClean="0"/>
-              <a:t>2/16/2026</a:t>
+              <a:t>2/23/2026</a:t>
             </a:fld>
             <a:endParaRPr lang="en-US"/>
           </a:p>
@@ -2449,7 +2449,7 @@
           <a:p>
             <a:fld id="{0D2F0FE0-C0B2-431B-95AF-3256C55C95DF}" type="datetimeFigureOut">
               <a:rPr lang="en-US" smtClean="0"/>
-              <a:t>2/16/2026</a:t>
+              <a:t>2/23/2026</a:t>
             </a:fld>
             <a:endParaRPr lang="en-US"/>
           </a:p>
@@ -2861,7 +2861,7 @@
           <a:p>
             <a:fld id="{0D2F0FE0-C0B2-431B-95AF-3256C55C95DF}" type="datetimeFigureOut">
               <a:rPr lang="en-US" smtClean="0"/>
-              <a:t>2/16/2026</a:t>
+              <a:t>2/23/2026</a:t>
             </a:fld>
             <a:endParaRPr lang="en-US"/>
           </a:p>
@@ -3002,7 +3002,7 @@
           <a:p>
             <a:fld id="{0D2F0FE0-C0B2-431B-95AF-3256C55C95DF}" type="datetimeFigureOut">
               <a:rPr lang="en-US" smtClean="0"/>
-              <a:t>2/16/2026</a:t>
+              <a:t>2/23/2026</a:t>
             </a:fld>
             <a:endParaRPr lang="en-US"/>
           </a:p>
@@ -3115,7 +3115,7 @@
           <a:p>
             <a:fld id="{0D2F0FE0-C0B2-431B-95AF-3256C55C95DF}" type="datetimeFigureOut">
               <a:rPr lang="en-US" smtClean="0"/>
-              <a:t>2/16/2026</a:t>
+              <a:t>2/23/2026</a:t>
             </a:fld>
             <a:endParaRPr lang="en-US"/>
           </a:p>
@@ -3426,7 +3426,7 @@
           <a:p>
             <a:fld id="{0D2F0FE0-C0B2-431B-95AF-3256C55C95DF}" type="datetimeFigureOut">
               <a:rPr lang="en-US" smtClean="0"/>
-              <a:t>2/16/2026</a:t>
+              <a:t>2/23/2026</a:t>
             </a:fld>
             <a:endParaRPr lang="en-US"/>
           </a:p>
@@ -3714,7 +3714,7 @@
           <a:p>
             <a:fld id="{0D2F0FE0-C0B2-431B-95AF-3256C55C95DF}" type="datetimeFigureOut">
               <a:rPr lang="en-US" smtClean="0"/>
-              <a:t>2/16/2026</a:t>
+              <a:t>2/23/2026</a:t>
             </a:fld>
             <a:endParaRPr lang="en-US"/>
           </a:p>
@@ -3912,7 +3912,7 @@
           <a:p>
             <a:fld id="{0D2F0FE0-C0B2-431B-95AF-3256C55C95DF}" type="datetimeFigureOut">
               <a:rPr lang="en-US" smtClean="0"/>
-              <a:t>2/16/2026</a:t>
+              <a:t>2/23/2026</a:t>
             </a:fld>
             <a:endParaRPr lang="en-US"/>
           </a:p>
@@ -4363,7 +4363,7 @@
           <a:p>
             <a:fld id="{0D2F0FE0-C0B2-431B-95AF-3256C55C95DF}" type="datetimeFigureOut">
               <a:rPr lang="en-US" smtClean="0"/>
-              <a:t>2/16/2026</a:t>
+              <a:t>2/23/2026</a:t>
             </a:fld>
             <a:endParaRPr lang="en-US"/>
           </a:p>
@@ -7945,7 +7945,7 @@
           <a:p>
             <a:fld id="{0D2F0FE0-C0B2-431B-95AF-3256C55C95DF}" type="datetimeFigureOut">
               <a:rPr lang="en-US" smtClean="0"/>
-              <a:t>2/16/2026</a:t>
+              <a:t>2/23/2026</a:t>
             </a:fld>
             <a:endParaRPr lang="en-US"/>
           </a:p>
@@ -11731,7 +11731,7 @@
         </p:nvSpPr>
         <p:spPr>
           <a:xfrm>
-            <a:off x="3836538" y="4147137"/>
+            <a:off x="3836538" y="3462404"/>
             <a:ext cx="1437273" cy="576072"/>
           </a:xfrm>
           <a:custGeom>
@@ -11928,7 +11928,7 @@
         </p:nvSpPr>
         <p:spPr>
           <a:xfrm>
-            <a:off x="3836538" y="3462404"/>
+            <a:off x="3836538" y="2782617"/>
             <a:ext cx="1437273" cy="576072"/>
           </a:xfrm>
           <a:custGeom>
@@ -12102,7 +12102,7 @@
         </p:nvSpPr>
         <p:spPr>
           <a:xfrm>
-            <a:off x="3836538" y="2782617"/>
+            <a:off x="5483997" y="3462404"/>
             <a:ext cx="1437273" cy="576072"/>
           </a:xfrm>
           <a:custGeom>
@@ -12200,7 +12200,7 @@
             </a:pathLst>
           </a:custGeom>
           <a:solidFill>
-            <a:srgbClr val="FFA72A"/>
+            <a:srgbClr val="92D050"/>
           </a:solidFill>
           <a:ln>
             <a:noFill/>
@@ -12234,7 +12234,7 @@
           </a:fontRef>
         </p:style>
         <p:txBody>
-          <a:bodyPr spcFirstLastPara="0" vert="horz" wrap="square" lIns="83858" tIns="83858" rIns="83858" bIns="83858" numCol="1" spcCol="1270" anchor="ctr" anchorCtr="0">
+          <a:bodyPr spcFirstLastPara="0" vert="horz" wrap="square" lIns="83859" tIns="83859" rIns="83859" bIns="83859" numCol="1" spcCol="1270" anchor="ctr" anchorCtr="0">
             <a:noAutofit/>
           </a:bodyPr>
           <a:lstStyle/>
@@ -12810,7 +12810,7 @@
         </p:nvSpPr>
         <p:spPr>
           <a:xfrm>
-            <a:off x="7121928" y="3462404"/>
+            <a:off x="5483997" y="4147137"/>
             <a:ext cx="1437273" cy="576072"/>
           </a:xfrm>
           <a:custGeom>
@@ -13355,7 +13355,7 @@
         </p:nvSpPr>
         <p:spPr>
           <a:xfrm>
-            <a:off x="5483997" y="3462404"/>
+            <a:off x="7121929" y="3462404"/>
             <a:ext cx="1437273" cy="576072"/>
           </a:xfrm>
           <a:custGeom>
@@ -13936,7 +13936,7 @@
         <p:spPr>
           <a:xfrm>
             <a:off x="3586811" y="1631952"/>
-            <a:ext cx="1944216" cy="326552"/>
+            <a:ext cx="1891727" cy="326552"/>
           </a:xfrm>
           <a:prstGeom prst="rect">
             <a:avLst/>
@@ -14116,7 +14116,7 @@
               <a:rPr lang="en-US" sz="1800" b="1" dirty="0">
                 <a:latin typeface="Aptos" panose="020B0004020202020204" pitchFamily="34" charset="0"/>
               </a:rPr>
-              <a:t>Recommended</a:t>
+              <a:t>“Must Support”</a:t>
             </a:r>
           </a:p>
         </p:txBody>
@@ -14371,7 +14371,7 @@
         </p:nvSpPr>
         <p:spPr>
           <a:xfrm>
-            <a:off x="3836538" y="4821276"/>
+            <a:off x="3836538" y="4147137"/>
             <a:ext cx="1437273" cy="576072"/>
           </a:xfrm>
           <a:custGeom>
@@ -14562,7 +14562,7 @@
         </p:nvSpPr>
         <p:spPr>
           <a:xfrm>
-            <a:off x="3836538" y="5495167"/>
+            <a:off x="3836538" y="4831870"/>
             <a:ext cx="1437273" cy="576072"/>
           </a:xfrm>
           <a:custGeom>
@@ -14755,6 +14755,42 @@
                 <a:latin typeface="Aptos" panose="020B0004020202020204" pitchFamily="34" charset="0"/>
               </a:rPr>
               <a:t>The US-PCS Composition</a:t>
+            </a:r>
+          </a:p>
+        </p:txBody>
+      </p:sp>
+      <p:sp>
+        <p:nvSpPr>
+          <p:cNvPr id="2" name="TextBox 1">
+            <a:extLst>
+              <a:ext uri="{FF2B5EF4-FFF2-40B4-BE49-F238E27FC236}">
+                <a16:creationId xmlns:a16="http://schemas.microsoft.com/office/drawing/2014/main" id="{A89499CC-BE78-1E7A-88F5-5DDEC1D4834B}"/>
+              </a:ext>
+            </a:extLst>
+          </p:cNvPr>
+          <p:cNvSpPr txBox="1"/>
+          <p:nvPr/>
+        </p:nvSpPr>
+        <p:spPr>
+          <a:xfrm>
+            <a:off x="362272" y="5922150"/>
+            <a:ext cx="8419456" cy="307777"/>
+          </a:xfrm>
+          <a:prstGeom prst="rect">
+            <a:avLst/>
+          </a:prstGeom>
+          <a:noFill/>
+        </p:spPr>
+        <p:txBody>
+          <a:bodyPr wrap="square" rtlCol="0">
+            <a:spAutoFit/>
+          </a:bodyPr>
+          <a:lstStyle/>
+          <a:p>
+            <a:pPr algn="ctr"/>
+            <a:r>
+              <a:rPr lang="en-US" sz="1400" dirty="0"/>
+              <a:t>“Must Support” means systems must be capable to send and receive these sections</a:t>
             </a:r>
           </a:p>
         </p:txBody>

</xml_diff>

<commit_message>
Changes based on 2/25 US-PCS call. Image switch
</commit_message>
<xml_diff>
--- a/US-PCS ballot images 2026.pptx
+++ b/US-PCS ballot images 2026.pptx
@@ -6,13 +6,14 @@
     <p:sldMasterId id="2147483670" r:id="rId2"/>
   </p:sldMasterIdLst>
   <p:notesMasterIdLst>
-    <p:notesMasterId r:id="rId7"/>
+    <p:notesMasterId r:id="rId8"/>
   </p:notesMasterIdLst>
   <p:sldIdLst>
     <p:sldId id="801" r:id="rId3"/>
     <p:sldId id="258" r:id="rId4"/>
     <p:sldId id="802" r:id="rId5"/>
     <p:sldId id="803" r:id="rId6"/>
+    <p:sldId id="804" r:id="rId7"/>
   </p:sldIdLst>
   <p:sldSz cx="9144000" cy="6858000" type="screen4x3"/>
   <p:notesSz cx="6858000" cy="9144000"/>
@@ -120,6 +121,7 @@
             <p14:sldId id="258"/>
             <p14:sldId id="802"/>
             <p14:sldId id="803"/>
+            <p14:sldId id="804"/>
           </p14:sldIdLst>
         </p14:section>
       </p14:sectionLst>
@@ -859,7 +861,7 @@
           <a:p>
             <a:fld id="{10B9A41D-2C14-4FD9-A8FE-469DBFAB3809}" type="datetimeFigureOut">
               <a:rPr lang="en-CA" smtClean="0"/>
-              <a:t>2026-02-23</a:t>
+              <a:t>2026-02-25</a:t>
             </a:fld>
             <a:endParaRPr lang="en-CA" dirty="0"/>
           </a:p>
@@ -1711,7 +1713,7 @@
           <a:p>
             <a:fld id="{0D2F0FE0-C0B2-431B-95AF-3256C55C95DF}" type="datetimeFigureOut">
               <a:rPr lang="en-US" smtClean="0"/>
-              <a:t>2/23/2026</a:t>
+              <a:t>2/25/2026</a:t>
             </a:fld>
             <a:endParaRPr lang="en-US"/>
           </a:p>
@@ -1909,7 +1911,7 @@
           <a:p>
             <a:fld id="{0D2F0FE0-C0B2-431B-95AF-3256C55C95DF}" type="datetimeFigureOut">
               <a:rPr lang="en-US" smtClean="0"/>
-              <a:t>2/23/2026</a:t>
+              <a:t>2/25/2026</a:t>
             </a:fld>
             <a:endParaRPr lang="en-US"/>
           </a:p>
@@ -2184,7 +2186,7 @@
           <a:p>
             <a:fld id="{0D2F0FE0-C0B2-431B-95AF-3256C55C95DF}" type="datetimeFigureOut">
               <a:rPr lang="en-US" smtClean="0"/>
-              <a:t>2/23/2026</a:t>
+              <a:t>2/25/2026</a:t>
             </a:fld>
             <a:endParaRPr lang="en-US"/>
           </a:p>
@@ -2449,7 +2451,7 @@
           <a:p>
             <a:fld id="{0D2F0FE0-C0B2-431B-95AF-3256C55C95DF}" type="datetimeFigureOut">
               <a:rPr lang="en-US" smtClean="0"/>
-              <a:t>2/23/2026</a:t>
+              <a:t>2/25/2026</a:t>
             </a:fld>
             <a:endParaRPr lang="en-US"/>
           </a:p>
@@ -2861,7 +2863,7 @@
           <a:p>
             <a:fld id="{0D2F0FE0-C0B2-431B-95AF-3256C55C95DF}" type="datetimeFigureOut">
               <a:rPr lang="en-US" smtClean="0"/>
-              <a:t>2/23/2026</a:t>
+              <a:t>2/25/2026</a:t>
             </a:fld>
             <a:endParaRPr lang="en-US"/>
           </a:p>
@@ -3002,7 +3004,7 @@
           <a:p>
             <a:fld id="{0D2F0FE0-C0B2-431B-95AF-3256C55C95DF}" type="datetimeFigureOut">
               <a:rPr lang="en-US" smtClean="0"/>
-              <a:t>2/23/2026</a:t>
+              <a:t>2/25/2026</a:t>
             </a:fld>
             <a:endParaRPr lang="en-US"/>
           </a:p>
@@ -3115,7 +3117,7 @@
           <a:p>
             <a:fld id="{0D2F0FE0-C0B2-431B-95AF-3256C55C95DF}" type="datetimeFigureOut">
               <a:rPr lang="en-US" smtClean="0"/>
-              <a:t>2/23/2026</a:t>
+              <a:t>2/25/2026</a:t>
             </a:fld>
             <a:endParaRPr lang="en-US"/>
           </a:p>
@@ -3426,7 +3428,7 @@
           <a:p>
             <a:fld id="{0D2F0FE0-C0B2-431B-95AF-3256C55C95DF}" type="datetimeFigureOut">
               <a:rPr lang="en-US" smtClean="0"/>
-              <a:t>2/23/2026</a:t>
+              <a:t>2/25/2026</a:t>
             </a:fld>
             <a:endParaRPr lang="en-US"/>
           </a:p>
@@ -3714,7 +3716,7 @@
           <a:p>
             <a:fld id="{0D2F0FE0-C0B2-431B-95AF-3256C55C95DF}" type="datetimeFigureOut">
               <a:rPr lang="en-US" smtClean="0"/>
-              <a:t>2/23/2026</a:t>
+              <a:t>2/25/2026</a:t>
             </a:fld>
             <a:endParaRPr lang="en-US"/>
           </a:p>
@@ -3912,7 +3914,7 @@
           <a:p>
             <a:fld id="{0D2F0FE0-C0B2-431B-95AF-3256C55C95DF}" type="datetimeFigureOut">
               <a:rPr lang="en-US" smtClean="0"/>
-              <a:t>2/23/2026</a:t>
+              <a:t>2/25/2026</a:t>
             </a:fld>
             <a:endParaRPr lang="en-US"/>
           </a:p>
@@ -4363,7 +4365,7 @@
           <a:p>
             <a:fld id="{0D2F0FE0-C0B2-431B-95AF-3256C55C95DF}" type="datetimeFigureOut">
               <a:rPr lang="en-US" smtClean="0"/>
-              <a:t>2/23/2026</a:t>
+              <a:t>2/25/2026</a:t>
             </a:fld>
             <a:endParaRPr lang="en-US"/>
           </a:p>
@@ -7945,7 +7947,7 @@
           <a:p>
             <a:fld id="{0D2F0FE0-C0B2-431B-95AF-3256C55C95DF}" type="datetimeFigureOut">
               <a:rPr lang="en-US" smtClean="0"/>
-              <a:t>2/23/2026</a:t>
+              <a:t>2/25/2026</a:t>
             </a:fld>
             <a:endParaRPr lang="en-US"/>
           </a:p>
@@ -9852,7 +9854,7 @@
         <p:spPr>
           <a:xfrm>
             <a:off x="4840947" y="2689810"/>
-            <a:ext cx="1651414" cy="307777"/>
+            <a:ext cx="1619354" cy="307777"/>
           </a:xfrm>
           <a:prstGeom prst="rect">
             <a:avLst/>
@@ -9875,7 +9877,7 @@
                 </a:solidFill>
                 <a:latin typeface="Aptos" panose="020B0004020202020204" pitchFamily="34" charset="0"/>
               </a:rPr>
-              <a:t>+10 other sections</a:t>
+              <a:t>+11 other sections</a:t>
             </a:r>
           </a:p>
         </p:txBody>
@@ -11819,23 +11821,6 @@
               </a:rPr>
               <a:t>Results</a:t>
             </a:r>
-            <a:br>
-              <a:rPr lang="en-US" sz="1400" b="1" dirty="0">
-                <a:solidFill>
-                  <a:srgbClr val="FFFFFF"/>
-                </a:solidFill>
-                <a:latin typeface="Aptos" panose="020B0004020202020204" pitchFamily="34" charset="0"/>
-              </a:rPr>
-            </a:br>
-            <a:r>
-              <a:rPr lang="en-US" sz="1000" dirty="0">
-                <a:solidFill>
-                  <a:srgbClr val="FFFFFF"/>
-                </a:solidFill>
-                <a:latin typeface="Aptos" panose="020B0004020202020204" pitchFamily="34" charset="0"/>
-              </a:rPr>
-              <a:t>Laboratory/pathology + Radiology</a:t>
-            </a:r>
             <a:endParaRPr lang="en-US" sz="1400" dirty="0">
               <a:solidFill>
                 <a:srgbClr val="FFFFFF"/>
@@ -14459,23 +14444,12 @@
               </a:rPr>
               <a:t>Social History</a:t>
             </a:r>
-            <a:br>
-              <a:rPr lang="en-US" sz="1400" b="1" dirty="0">
-                <a:solidFill>
-                  <a:srgbClr val="FFFFFF"/>
-                </a:solidFill>
-                <a:latin typeface="Aptos" panose="020B0004020202020204" pitchFamily="34" charset="0"/>
-              </a:rPr>
-            </a:br>
-            <a:r>
-              <a:rPr lang="en-US" sz="1000" dirty="0">
-                <a:solidFill>
-                  <a:srgbClr val="FFFFFF"/>
-                </a:solidFill>
-                <a:latin typeface="Aptos" panose="020B0004020202020204" pitchFamily="34" charset="0"/>
-              </a:rPr>
-              <a:t>Smoking + Alcohol Use</a:t>
-            </a:r>
+            <a:endParaRPr lang="en-US" sz="1000" dirty="0">
+              <a:solidFill>
+                <a:srgbClr val="FFFFFF"/>
+              </a:solidFill>
+              <a:latin typeface="Aptos" panose="020B0004020202020204" pitchFamily="34" charset="0"/>
+            </a:endParaRPr>
           </a:p>
         </p:txBody>
       </p:sp>
@@ -16316,6 +16290,1385 @@
     <p:extLst>
       <p:ext uri="{BB962C8B-B14F-4D97-AF65-F5344CB8AC3E}">
         <p14:creationId xmlns:p14="http://schemas.microsoft.com/office/powerpoint/2010/main" val="3098516884"/>
+      </p:ext>
+    </p:extLst>
+  </p:cSld>
+  <p:clrMapOvr>
+    <a:masterClrMapping/>
+  </p:clrMapOvr>
+</p:sld>
+</file>
+
+<file path=ppt/slides/slide5.xml><?xml version="1.0" encoding="utf-8"?>
+<p:sld xmlns:a="http://schemas.openxmlformats.org/drawingml/2006/main" xmlns:r="http://schemas.openxmlformats.org/officeDocument/2006/relationships" xmlns:p="http://schemas.openxmlformats.org/presentationml/2006/main">
+  <p:cSld>
+    <p:spTree>
+      <p:nvGrpSpPr>
+        <p:cNvPr id="1" name=""/>
+        <p:cNvGrpSpPr/>
+        <p:nvPr/>
+      </p:nvGrpSpPr>
+      <p:grpSpPr>
+        <a:xfrm>
+          <a:off x="0" y="0"/>
+          <a:ext cx="0" cy="0"/>
+          <a:chOff x="0" y="0"/>
+          <a:chExt cx="0" cy="0"/>
+        </a:xfrm>
+      </p:grpSpPr>
+      <p:sp>
+        <p:nvSpPr>
+          <p:cNvPr id="13" name="Rectangle: Rounded Corners 12">
+            <a:extLst>
+              <a:ext uri="{FF2B5EF4-FFF2-40B4-BE49-F238E27FC236}">
+                <a16:creationId xmlns:a16="http://schemas.microsoft.com/office/drawing/2014/main" id="{C6C45EA6-7E40-6EB5-ABD4-13B9666000F2}"/>
+              </a:ext>
+            </a:extLst>
+          </p:cNvPr>
+          <p:cNvSpPr/>
+          <p:nvPr/>
+        </p:nvSpPr>
+        <p:spPr>
+          <a:xfrm>
+            <a:off x="206505" y="2780928"/>
+            <a:ext cx="4158991" cy="3672622"/>
+          </a:xfrm>
+          <a:prstGeom prst="roundRect">
+            <a:avLst>
+              <a:gd name="adj" fmla="val 6226"/>
+            </a:avLst>
+          </a:prstGeom>
+          <a:solidFill>
+            <a:schemeClr val="tx2">
+              <a:lumMod val="10000"/>
+              <a:lumOff val="90000"/>
+            </a:schemeClr>
+          </a:solidFill>
+          <a:ln>
+            <a:solidFill>
+              <a:schemeClr val="tx2">
+                <a:lumMod val="75000"/>
+                <a:lumOff val="25000"/>
+              </a:schemeClr>
+            </a:solidFill>
+          </a:ln>
+        </p:spPr>
+        <p:style>
+          <a:lnRef idx="2">
+            <a:schemeClr val="accent1">
+              <a:shade val="15000"/>
+            </a:schemeClr>
+          </a:lnRef>
+          <a:fillRef idx="1">
+            <a:schemeClr val="accent1"/>
+          </a:fillRef>
+          <a:effectRef idx="0">
+            <a:schemeClr val="accent1"/>
+          </a:effectRef>
+          <a:fontRef idx="minor">
+            <a:schemeClr val="lt1"/>
+          </a:fontRef>
+        </p:style>
+        <p:txBody>
+          <a:bodyPr rtlCol="0" anchor="ctr"/>
+          <a:lstStyle/>
+          <a:p>
+            <a:pPr algn="ctr"/>
+            <a:endParaRPr lang="en-US"/>
+          </a:p>
+        </p:txBody>
+      </p:sp>
+      <p:pic>
+        <p:nvPicPr>
+          <p:cNvPr id="4" name="Picture 3">
+            <a:extLst>
+              <a:ext uri="{FF2B5EF4-FFF2-40B4-BE49-F238E27FC236}">
+                <a16:creationId xmlns:a16="http://schemas.microsoft.com/office/drawing/2014/main" id="{76A6C2EF-3DB1-9EF8-2696-E6AE6D6E6F0B}"/>
+              </a:ext>
+            </a:extLst>
+          </p:cNvPr>
+          <p:cNvPicPr>
+            <a:picLocks noChangeAspect="1"/>
+          </p:cNvPicPr>
+          <p:nvPr/>
+        </p:nvPicPr>
+        <p:blipFill>
+          <a:blip r:embed="rId2"/>
+          <a:srcRect l="21448" t="17026" r="23535" b="23626"/>
+          <a:stretch>
+            <a:fillRect/>
+          </a:stretch>
+        </p:blipFill>
+        <p:spPr>
+          <a:xfrm>
+            <a:off x="450304" y="3701057"/>
+            <a:ext cx="839676" cy="922566"/>
+          </a:xfrm>
+          <a:prstGeom prst="rect">
+            <a:avLst/>
+          </a:prstGeom>
+        </p:spPr>
+      </p:pic>
+      <p:pic>
+        <p:nvPicPr>
+          <p:cNvPr id="5" name="Picture 2" descr="logo fhir">
+            <a:extLst>
+              <a:ext uri="{FF2B5EF4-FFF2-40B4-BE49-F238E27FC236}">
+                <a16:creationId xmlns:a16="http://schemas.microsoft.com/office/drawing/2014/main" id="{17ED4006-1704-AC0D-FE69-C8C006E5ED38}"/>
+              </a:ext>
+            </a:extLst>
+          </p:cNvPr>
+          <p:cNvPicPr>
+            <a:picLocks noChangeAspect="1" noChangeArrowheads="1"/>
+          </p:cNvPicPr>
+          <p:nvPr/>
+        </p:nvPicPr>
+        <p:blipFill rotWithShape="1">
+          <a:blip r:embed="rId3" cstate="print">
+            <a:extLst>
+              <a:ext uri="{28A0092B-C50C-407E-A947-70E740481C1C}">
+                <a14:useLocalDpi xmlns:a14="http://schemas.microsoft.com/office/drawing/2010/main" val="0"/>
+              </a:ext>
+            </a:extLst>
+          </a:blip>
+          <a:srcRect r="83546"/>
+          <a:stretch>
+            <a:fillRect/>
+          </a:stretch>
+        </p:blipFill>
+        <p:spPr bwMode="auto">
+          <a:xfrm>
+            <a:off x="450304" y="3500446"/>
+            <a:ext cx="350236" cy="512756"/>
+          </a:xfrm>
+          <a:prstGeom prst="rect">
+            <a:avLst/>
+          </a:prstGeom>
+          <a:noFill/>
+          <a:extLst>
+            <a:ext uri="{909E8E84-426E-40DD-AFC4-6F175D3DCCD1}">
+              <a14:hiddenFill xmlns:a14="http://schemas.microsoft.com/office/drawing/2010/main">
+                <a:solidFill>
+                  <a:srgbClr val="FFFFFF"/>
+                </a:solidFill>
+              </a14:hiddenFill>
+            </a:ext>
+          </a:extLst>
+        </p:spPr>
+      </p:pic>
+      <p:sp>
+        <p:nvSpPr>
+          <p:cNvPr id="6" name="TextBox 5">
+            <a:extLst>
+              <a:ext uri="{FF2B5EF4-FFF2-40B4-BE49-F238E27FC236}">
+                <a16:creationId xmlns:a16="http://schemas.microsoft.com/office/drawing/2014/main" id="{92680516-85AC-2877-BCF1-D30FC3832B6D}"/>
+              </a:ext>
+            </a:extLst>
+          </p:cNvPr>
+          <p:cNvSpPr txBox="1"/>
+          <p:nvPr/>
+        </p:nvSpPr>
+        <p:spPr>
+          <a:xfrm>
+            <a:off x="0" y="1835372"/>
+            <a:ext cx="4571999" cy="830997"/>
+          </a:xfrm>
+          <a:prstGeom prst="rect">
+            <a:avLst/>
+          </a:prstGeom>
+          <a:noFill/>
+        </p:spPr>
+        <p:txBody>
+          <a:bodyPr wrap="square" rtlCol="0">
+            <a:spAutoFit/>
+          </a:bodyPr>
+          <a:lstStyle/>
+          <a:p>
+            <a:pPr algn="ctr"/>
+            <a:r>
+              <a:rPr lang="en-US" sz="2400" b="1" dirty="0"/>
+              <a:t>What goes into a</a:t>
+            </a:r>
+            <a:br>
+              <a:rPr lang="en-US" sz="2400" b="1" dirty="0"/>
+            </a:br>
+            <a:r>
+              <a:rPr lang="en-US" sz="2400" b="1" dirty="0"/>
+              <a:t>US-PCS patient summary?</a:t>
+            </a:r>
+          </a:p>
+        </p:txBody>
+      </p:sp>
+      <p:sp>
+        <p:nvSpPr>
+          <p:cNvPr id="7" name="TextBox 6">
+            <a:extLst>
+              <a:ext uri="{FF2B5EF4-FFF2-40B4-BE49-F238E27FC236}">
+                <a16:creationId xmlns:a16="http://schemas.microsoft.com/office/drawing/2014/main" id="{950F6F44-361A-FF12-2270-80FA74827035}"/>
+              </a:ext>
+            </a:extLst>
+          </p:cNvPr>
+          <p:cNvSpPr txBox="1"/>
+          <p:nvPr/>
+        </p:nvSpPr>
+        <p:spPr>
+          <a:xfrm>
+            <a:off x="158635" y="2862913"/>
+            <a:ext cx="4185465" cy="369332"/>
+          </a:xfrm>
+          <a:prstGeom prst="rect">
+            <a:avLst/>
+          </a:prstGeom>
+          <a:noFill/>
+        </p:spPr>
+        <p:txBody>
+          <a:bodyPr wrap="square" rtlCol="0">
+            <a:spAutoFit/>
+          </a:bodyPr>
+          <a:lstStyle/>
+          <a:p>
+            <a:pPr algn="ctr"/>
+            <a:r>
+              <a:rPr lang="en-US" b="1" u="sng" dirty="0"/>
+              <a:t>Summaries Require</a:t>
+            </a:r>
+          </a:p>
+        </p:txBody>
+      </p:sp>
+      <p:sp>
+        <p:nvSpPr>
+          <p:cNvPr id="8" name="TextBox 7">
+            <a:extLst>
+              <a:ext uri="{FF2B5EF4-FFF2-40B4-BE49-F238E27FC236}">
+                <a16:creationId xmlns:a16="http://schemas.microsoft.com/office/drawing/2014/main" id="{13486972-71A9-36FF-2D9C-893108288039}"/>
+              </a:ext>
+            </a:extLst>
+          </p:cNvPr>
+          <p:cNvSpPr txBox="1"/>
+          <p:nvPr/>
+        </p:nvSpPr>
+        <p:spPr>
+          <a:xfrm>
+            <a:off x="4571999" y="1835372"/>
+            <a:ext cx="4571999" cy="830997"/>
+          </a:xfrm>
+          <a:prstGeom prst="rect">
+            <a:avLst/>
+          </a:prstGeom>
+          <a:noFill/>
+        </p:spPr>
+        <p:txBody>
+          <a:bodyPr wrap="square" rtlCol="0">
+            <a:spAutoFit/>
+          </a:bodyPr>
+          <a:lstStyle/>
+          <a:p>
+            <a:pPr algn="ctr"/>
+            <a:r>
+              <a:rPr lang="en-US" sz="2400" b="1" dirty="0"/>
+              <a:t>What capabilities must </a:t>
+            </a:r>
+            <a:br>
+              <a:rPr lang="en-US" sz="2400" b="1" dirty="0"/>
+            </a:br>
+            <a:r>
+              <a:rPr lang="en-US" sz="2400" b="1" dirty="0"/>
+              <a:t>US-PCS systems support? </a:t>
+            </a:r>
+          </a:p>
+        </p:txBody>
+      </p:sp>
+      <p:cxnSp>
+        <p:nvCxnSpPr>
+          <p:cNvPr id="10" name="Straight Connector 9">
+            <a:extLst>
+              <a:ext uri="{FF2B5EF4-FFF2-40B4-BE49-F238E27FC236}">
+                <a16:creationId xmlns:a16="http://schemas.microsoft.com/office/drawing/2014/main" id="{35421645-74F6-D240-D3FD-5710A2660E3A}"/>
+              </a:ext>
+            </a:extLst>
+          </p:cNvPr>
+          <p:cNvCxnSpPr>
+            <a:cxnSpLocks/>
+          </p:cNvCxnSpPr>
+          <p:nvPr/>
+        </p:nvCxnSpPr>
+        <p:spPr>
+          <a:xfrm>
+            <a:off x="4584699" y="1835372"/>
+            <a:ext cx="0" cy="5022628"/>
+          </a:xfrm>
+          <a:prstGeom prst="line">
+            <a:avLst/>
+          </a:prstGeom>
+          <a:ln w="57150">
+            <a:solidFill>
+              <a:schemeClr val="bg1">
+                <a:lumMod val="75000"/>
+              </a:schemeClr>
+            </a:solidFill>
+          </a:ln>
+        </p:spPr>
+        <p:style>
+          <a:lnRef idx="2">
+            <a:schemeClr val="accent1"/>
+          </a:lnRef>
+          <a:fillRef idx="0">
+            <a:schemeClr val="accent1"/>
+          </a:fillRef>
+          <a:effectRef idx="1">
+            <a:schemeClr val="accent1"/>
+          </a:effectRef>
+          <a:fontRef idx="minor">
+            <a:schemeClr val="tx1"/>
+          </a:fontRef>
+        </p:style>
+      </p:cxnSp>
+      <p:sp>
+        <p:nvSpPr>
+          <p:cNvPr id="12" name="TextBox 11">
+            <a:extLst>
+              <a:ext uri="{FF2B5EF4-FFF2-40B4-BE49-F238E27FC236}">
+                <a16:creationId xmlns:a16="http://schemas.microsoft.com/office/drawing/2014/main" id="{631F5697-C786-0EFC-1BD9-139DC83E7969}"/>
+              </a:ext>
+            </a:extLst>
+          </p:cNvPr>
+          <p:cNvSpPr txBox="1"/>
+          <p:nvPr/>
+        </p:nvSpPr>
+        <p:spPr>
+          <a:xfrm>
+            <a:off x="1485176" y="3314229"/>
+            <a:ext cx="2734329" cy="1477328"/>
+          </a:xfrm>
+          <a:prstGeom prst="rect">
+            <a:avLst/>
+          </a:prstGeom>
+          <a:noFill/>
+        </p:spPr>
+        <p:txBody>
+          <a:bodyPr wrap="square" rtlCol="0">
+            <a:spAutoFit/>
+          </a:bodyPr>
+          <a:lstStyle/>
+          <a:p>
+            <a:pPr marL="227013" indent="-227013">
+              <a:buFont typeface="Wingdings" panose="05000000000000000000" pitchFamily="2" charset="2"/>
+              <a:buChar char="§"/>
+            </a:pPr>
+            <a:r>
+              <a:rPr lang="en-US" dirty="0"/>
+              <a:t>Patient Information</a:t>
+            </a:r>
+          </a:p>
+          <a:p>
+            <a:pPr marL="227013" indent="-227013">
+              <a:buFont typeface="Wingdings" panose="05000000000000000000" pitchFamily="2" charset="2"/>
+              <a:buChar char="§"/>
+            </a:pPr>
+            <a:r>
+              <a:rPr lang="en-US" dirty="0"/>
+              <a:t>Document Information</a:t>
+            </a:r>
+          </a:p>
+          <a:p>
+            <a:pPr marL="227013" indent="-227013">
+              <a:buFont typeface="Wingdings" panose="05000000000000000000" pitchFamily="2" charset="2"/>
+              <a:buChar char="§"/>
+            </a:pPr>
+            <a:r>
+              <a:rPr lang="en-US" dirty="0"/>
+              <a:t>Current Problems</a:t>
+            </a:r>
+          </a:p>
+          <a:p>
+            <a:pPr marL="227013" indent="-227013">
+              <a:buFont typeface="Wingdings" panose="05000000000000000000" pitchFamily="2" charset="2"/>
+              <a:buChar char="§"/>
+            </a:pPr>
+            <a:r>
+              <a:rPr lang="en-US" dirty="0"/>
+              <a:t>Current Allergies</a:t>
+            </a:r>
+          </a:p>
+          <a:p>
+            <a:pPr marL="227013" indent="-227013">
+              <a:buFont typeface="Wingdings" panose="05000000000000000000" pitchFamily="2" charset="2"/>
+              <a:buChar char="§"/>
+            </a:pPr>
+            <a:r>
+              <a:rPr lang="en-US" dirty="0"/>
+              <a:t>Current Medications</a:t>
+            </a:r>
+          </a:p>
+        </p:txBody>
+      </p:sp>
+      <p:sp>
+        <p:nvSpPr>
+          <p:cNvPr id="14" name="TextBox 13">
+            <a:extLst>
+              <a:ext uri="{FF2B5EF4-FFF2-40B4-BE49-F238E27FC236}">
+                <a16:creationId xmlns:a16="http://schemas.microsoft.com/office/drawing/2014/main" id="{DA541120-9C50-AB81-7B83-6BD0BC66F836}"/>
+              </a:ext>
+            </a:extLst>
+          </p:cNvPr>
+          <p:cNvSpPr txBox="1"/>
+          <p:nvPr/>
+        </p:nvSpPr>
+        <p:spPr>
+          <a:xfrm>
+            <a:off x="158635" y="4881718"/>
+            <a:ext cx="4185466" cy="1477328"/>
+          </a:xfrm>
+          <a:prstGeom prst="rect">
+            <a:avLst/>
+          </a:prstGeom>
+          <a:noFill/>
+        </p:spPr>
+        <p:txBody>
+          <a:bodyPr wrap="square" rtlCol="0">
+            <a:spAutoFit/>
+          </a:bodyPr>
+          <a:lstStyle/>
+          <a:p>
+            <a:pPr algn="ctr"/>
+            <a:r>
+              <a:rPr lang="en-US" dirty="0"/>
+              <a:t>Other data may be sent to fulfill the</a:t>
+            </a:r>
+            <a:br>
+              <a:rPr lang="en-US" dirty="0"/>
+            </a:br>
+            <a:r>
+              <a:rPr lang="en-US" dirty="0"/>
+              <a:t>use-case of the US-PCS. Summaries </a:t>
+            </a:r>
+            <a:br>
+              <a:rPr lang="en-US" dirty="0"/>
+            </a:br>
+            <a:r>
+              <a:rPr lang="en-US" dirty="0"/>
+              <a:t>are </a:t>
+            </a:r>
+            <a:r>
+              <a:rPr lang="en-US" b="1" dirty="0"/>
+              <a:t>minimal</a:t>
+            </a:r>
+            <a:r>
+              <a:rPr lang="en-US" dirty="0"/>
+              <a:t> and </a:t>
+            </a:r>
+            <a:r>
+              <a:rPr lang="en-US" b="1" dirty="0"/>
+              <a:t>non-exhaustive</a:t>
+            </a:r>
+            <a:r>
+              <a:rPr lang="en-US" dirty="0"/>
+              <a:t> to support clinical decision-making </a:t>
+            </a:r>
+            <a:br>
+              <a:rPr lang="en-US" dirty="0"/>
+            </a:br>
+            <a:r>
+              <a:rPr lang="en-US" dirty="0"/>
+              <a:t>across organizational borders</a:t>
+            </a:r>
+          </a:p>
+        </p:txBody>
+      </p:sp>
+      <p:sp>
+        <p:nvSpPr>
+          <p:cNvPr id="15" name="Rectangle: Rounded Corners 14">
+            <a:extLst>
+              <a:ext uri="{FF2B5EF4-FFF2-40B4-BE49-F238E27FC236}">
+                <a16:creationId xmlns:a16="http://schemas.microsoft.com/office/drawing/2014/main" id="{F24B6BA7-5002-B454-4FAA-47549EA44BFD}"/>
+              </a:ext>
+            </a:extLst>
+          </p:cNvPr>
+          <p:cNvSpPr/>
+          <p:nvPr/>
+        </p:nvSpPr>
+        <p:spPr>
+          <a:xfrm>
+            <a:off x="4825298" y="2780928"/>
+            <a:ext cx="4112197" cy="3672622"/>
+          </a:xfrm>
+          <a:prstGeom prst="roundRect">
+            <a:avLst>
+              <a:gd name="adj" fmla="val 4823"/>
+            </a:avLst>
+          </a:prstGeom>
+          <a:solidFill>
+            <a:schemeClr val="accent2">
+              <a:lumMod val="20000"/>
+              <a:lumOff val="80000"/>
+            </a:schemeClr>
+          </a:solidFill>
+          <a:ln>
+            <a:solidFill>
+              <a:schemeClr val="accent2">
+                <a:lumMod val="75000"/>
+              </a:schemeClr>
+            </a:solidFill>
+          </a:ln>
+        </p:spPr>
+        <p:style>
+          <a:lnRef idx="2">
+            <a:schemeClr val="accent1">
+              <a:shade val="15000"/>
+            </a:schemeClr>
+          </a:lnRef>
+          <a:fillRef idx="1">
+            <a:schemeClr val="accent1"/>
+          </a:fillRef>
+          <a:effectRef idx="0">
+            <a:schemeClr val="accent1"/>
+          </a:effectRef>
+          <a:fontRef idx="minor">
+            <a:schemeClr val="lt1"/>
+          </a:fontRef>
+        </p:style>
+        <p:txBody>
+          <a:bodyPr rtlCol="0" anchor="ctr"/>
+          <a:lstStyle/>
+          <a:p>
+            <a:pPr algn="ctr"/>
+            <a:endParaRPr lang="en-US"/>
+          </a:p>
+        </p:txBody>
+      </p:sp>
+      <p:sp>
+        <p:nvSpPr>
+          <p:cNvPr id="16" name="TextBox 15">
+            <a:extLst>
+              <a:ext uri="{FF2B5EF4-FFF2-40B4-BE49-F238E27FC236}">
+                <a16:creationId xmlns:a16="http://schemas.microsoft.com/office/drawing/2014/main" id="{FB3D4DF1-FB70-89A6-D18B-0202C380FC94}"/>
+              </a:ext>
+            </a:extLst>
+          </p:cNvPr>
+          <p:cNvSpPr txBox="1"/>
+          <p:nvPr/>
+        </p:nvSpPr>
+        <p:spPr>
+          <a:xfrm>
+            <a:off x="5688920" y="2862913"/>
+            <a:ext cx="2586606" cy="369332"/>
+          </a:xfrm>
+          <a:prstGeom prst="rect">
+            <a:avLst/>
+          </a:prstGeom>
+          <a:noFill/>
+        </p:spPr>
+        <p:txBody>
+          <a:bodyPr wrap="none" rtlCol="0">
+            <a:spAutoFit/>
+          </a:bodyPr>
+          <a:lstStyle/>
+          <a:p>
+            <a:pPr algn="ctr"/>
+            <a:r>
+              <a:rPr lang="en-US" b="1" u="sng" dirty="0">
+                <a:solidFill>
+                  <a:schemeClr val="tx2"/>
+                </a:solidFill>
+              </a:rPr>
+              <a:t>Systems Must Support</a:t>
+            </a:r>
+          </a:p>
+        </p:txBody>
+      </p:sp>
+      <p:sp>
+        <p:nvSpPr>
+          <p:cNvPr id="17" name="TextBox 16">
+            <a:extLst>
+              <a:ext uri="{FF2B5EF4-FFF2-40B4-BE49-F238E27FC236}">
+                <a16:creationId xmlns:a16="http://schemas.microsoft.com/office/drawing/2014/main" id="{D9B14D61-942A-01EC-A9F7-C8D0C50C4D75}"/>
+              </a:ext>
+            </a:extLst>
+          </p:cNvPr>
+          <p:cNvSpPr txBox="1"/>
+          <p:nvPr/>
+        </p:nvSpPr>
+        <p:spPr>
+          <a:xfrm>
+            <a:off x="4934274" y="3243349"/>
+            <a:ext cx="4011088" cy="3247812"/>
+          </a:xfrm>
+          <a:prstGeom prst="rect">
+            <a:avLst/>
+          </a:prstGeom>
+          <a:noFill/>
+        </p:spPr>
+        <p:txBody>
+          <a:bodyPr wrap="square" rtlCol="0">
+            <a:spAutoFit/>
+          </a:bodyPr>
+          <a:lstStyle/>
+          <a:p>
+            <a:pPr marL="227013" indent="-227013">
+              <a:buFont typeface="Wingdings" panose="05000000000000000000" pitchFamily="2" charset="2"/>
+              <a:buChar char="§"/>
+            </a:pPr>
+            <a:r>
+              <a:rPr lang="en-US" dirty="0"/>
+              <a:t>US-PCS Bundle &amp; Composition</a:t>
+            </a:r>
+          </a:p>
+          <a:p>
+            <a:pPr marL="227013" indent="-227013">
+              <a:buFont typeface="Wingdings" panose="05000000000000000000" pitchFamily="2" charset="2"/>
+              <a:buChar char="§"/>
+            </a:pPr>
+            <a:r>
+              <a:rPr lang="en-US" dirty="0"/>
+              <a:t>US Core (6.1.0 or higher)</a:t>
+            </a:r>
+          </a:p>
+          <a:p>
+            <a:pPr marL="742950" lvl="1" indent="-285750">
+              <a:lnSpc>
+                <a:spcPct val="95000"/>
+              </a:lnSpc>
+              <a:buFont typeface="Aptos" panose="020B0004020202020204" pitchFamily="34" charset="0"/>
+              <a:buChar char="–"/>
+            </a:pPr>
+            <a:r>
+              <a:rPr lang="en-US" dirty="0"/>
+              <a:t>Patient</a:t>
+            </a:r>
+          </a:p>
+          <a:p>
+            <a:pPr marL="742950" lvl="1" indent="-285750">
+              <a:lnSpc>
+                <a:spcPct val="95000"/>
+              </a:lnSpc>
+              <a:buFont typeface="Aptos" panose="020B0004020202020204" pitchFamily="34" charset="0"/>
+              <a:buChar char="–"/>
+            </a:pPr>
+            <a:r>
+              <a:rPr lang="en-US" dirty="0"/>
+              <a:t>Organization</a:t>
+            </a:r>
+          </a:p>
+          <a:p>
+            <a:pPr marL="742950" lvl="1" indent="-285750">
+              <a:lnSpc>
+                <a:spcPct val="95000"/>
+              </a:lnSpc>
+              <a:buFont typeface="Aptos" panose="020B0004020202020204" pitchFamily="34" charset="0"/>
+              <a:buChar char="–"/>
+            </a:pPr>
+            <a:r>
+              <a:rPr lang="en-US" dirty="0"/>
+              <a:t>Practitioner</a:t>
+            </a:r>
+          </a:p>
+          <a:p>
+            <a:pPr marL="742950" lvl="1" indent="-285750">
+              <a:lnSpc>
+                <a:spcPct val="95000"/>
+              </a:lnSpc>
+              <a:buFont typeface="Aptos" panose="020B0004020202020204" pitchFamily="34" charset="0"/>
+              <a:buChar char="–"/>
+            </a:pPr>
+            <a:r>
+              <a:rPr lang="en-US" dirty="0"/>
+              <a:t>Section Clinical Resources</a:t>
+            </a:r>
+            <a:br>
+              <a:rPr lang="en-US" dirty="0"/>
+            </a:br>
+            <a:endParaRPr lang="en-US" sz="200" dirty="0"/>
+          </a:p>
+          <a:p>
+            <a:pPr marL="227013" indent="-227013">
+              <a:buFont typeface="Wingdings" panose="05000000000000000000" pitchFamily="2" charset="2"/>
+              <a:buChar char="§"/>
+            </a:pPr>
+            <a:r>
+              <a:rPr lang="en-US" dirty="0"/>
+              <a:t>Seven Sections</a:t>
+            </a:r>
+          </a:p>
+          <a:p>
+            <a:pPr marL="227013" indent="-227013">
+              <a:buFont typeface="Wingdings" panose="05000000000000000000" pitchFamily="2" charset="2"/>
+              <a:buChar char="§"/>
+            </a:pPr>
+            <a:endParaRPr lang="en-US" sz="2000" dirty="0"/>
+          </a:p>
+          <a:p>
+            <a:pPr marL="227013" indent="-227013">
+              <a:buFont typeface="Wingdings" panose="05000000000000000000" pitchFamily="2" charset="2"/>
+              <a:buChar char="§"/>
+            </a:pPr>
+            <a:endParaRPr lang="en-US" sz="2000" dirty="0"/>
+          </a:p>
+          <a:p>
+            <a:endParaRPr lang="en-US" dirty="0"/>
+          </a:p>
+          <a:p>
+            <a:pPr marL="227013" indent="-227013">
+              <a:buFont typeface="Wingdings" panose="05000000000000000000" pitchFamily="2" charset="2"/>
+              <a:buChar char="§"/>
+            </a:pPr>
+            <a:r>
+              <a:rPr lang="en-US" dirty="0"/>
+              <a:t>The IPS $summary operation</a:t>
+            </a:r>
+          </a:p>
+        </p:txBody>
+      </p:sp>
+      <p:sp>
+        <p:nvSpPr>
+          <p:cNvPr id="18" name="TextBox 17">
+            <a:extLst>
+              <a:ext uri="{FF2B5EF4-FFF2-40B4-BE49-F238E27FC236}">
+                <a16:creationId xmlns:a16="http://schemas.microsoft.com/office/drawing/2014/main" id="{3C0BD516-CDD5-3B12-FEC9-011DBF34E178}"/>
+              </a:ext>
+            </a:extLst>
+          </p:cNvPr>
+          <p:cNvSpPr txBox="1"/>
+          <p:nvPr/>
+        </p:nvSpPr>
+        <p:spPr>
+          <a:xfrm>
+            <a:off x="5204806" y="5139327"/>
+            <a:ext cx="1920475" cy="923330"/>
+          </a:xfrm>
+          <a:prstGeom prst="rect">
+            <a:avLst/>
+          </a:prstGeom>
+          <a:noFill/>
+        </p:spPr>
+        <p:txBody>
+          <a:bodyPr wrap="square" rtlCol="0">
+            <a:spAutoFit/>
+          </a:bodyPr>
+          <a:lstStyle/>
+          <a:p>
+            <a:pPr marL="284163" indent="-284163">
+              <a:buFont typeface="+mj-lt"/>
+              <a:buAutoNum type="arabicPeriod"/>
+            </a:pPr>
+            <a:r>
+              <a:rPr lang="en-US" dirty="0"/>
+              <a:t>Problems</a:t>
+            </a:r>
+          </a:p>
+          <a:p>
+            <a:pPr marL="284163" indent="-284163">
+              <a:buFont typeface="+mj-lt"/>
+              <a:buAutoNum type="arabicPeriod"/>
+            </a:pPr>
+            <a:r>
+              <a:rPr lang="en-US" dirty="0"/>
+              <a:t>Allergies</a:t>
+            </a:r>
+          </a:p>
+          <a:p>
+            <a:pPr marL="284163" indent="-284163">
+              <a:buFont typeface="+mj-lt"/>
+              <a:buAutoNum type="arabicPeriod"/>
+            </a:pPr>
+            <a:r>
+              <a:rPr lang="en-US" dirty="0"/>
+              <a:t>Medications</a:t>
+            </a:r>
+          </a:p>
+        </p:txBody>
+      </p:sp>
+      <p:sp>
+        <p:nvSpPr>
+          <p:cNvPr id="19" name="TextBox 18">
+            <a:extLst>
+              <a:ext uri="{FF2B5EF4-FFF2-40B4-BE49-F238E27FC236}">
+                <a16:creationId xmlns:a16="http://schemas.microsoft.com/office/drawing/2014/main" id="{5E1696A9-C897-1AE7-F0AA-3B8D5CC1BA05}"/>
+              </a:ext>
+            </a:extLst>
+          </p:cNvPr>
+          <p:cNvSpPr txBox="1"/>
+          <p:nvPr/>
+        </p:nvSpPr>
+        <p:spPr>
+          <a:xfrm>
+            <a:off x="6914304" y="4862328"/>
+            <a:ext cx="2023191" cy="1200329"/>
+          </a:xfrm>
+          <a:prstGeom prst="rect">
+            <a:avLst/>
+          </a:prstGeom>
+          <a:noFill/>
+        </p:spPr>
+        <p:txBody>
+          <a:bodyPr wrap="square" rtlCol="0">
+            <a:spAutoFit/>
+          </a:bodyPr>
+          <a:lstStyle/>
+          <a:p>
+            <a:pPr marL="285750" indent="-285750">
+              <a:buFont typeface="+mj-lt"/>
+              <a:buAutoNum type="arabicPeriod" startAt="4"/>
+            </a:pPr>
+            <a:r>
+              <a:rPr lang="en-US" dirty="0"/>
+              <a:t>Encounters</a:t>
+            </a:r>
+          </a:p>
+          <a:p>
+            <a:pPr marL="285750" indent="-285750">
+              <a:buFont typeface="+mj-lt"/>
+              <a:buAutoNum type="arabicPeriod" startAt="4"/>
+            </a:pPr>
+            <a:r>
+              <a:rPr lang="en-US" dirty="0"/>
+              <a:t>Immunizations</a:t>
+            </a:r>
+          </a:p>
+          <a:p>
+            <a:pPr marL="284163" indent="-284163">
+              <a:buFont typeface="+mj-lt"/>
+              <a:buAutoNum type="arabicPeriod" startAt="4"/>
+            </a:pPr>
+            <a:r>
+              <a:rPr lang="en-US" dirty="0"/>
+              <a:t>Procedures </a:t>
+            </a:r>
+          </a:p>
+          <a:p>
+            <a:pPr marL="284163" indent="-284163">
+              <a:buFont typeface="+mj-lt"/>
+              <a:buAutoNum type="arabicPeriod" startAt="4"/>
+            </a:pPr>
+            <a:r>
+              <a:rPr lang="en-US" dirty="0"/>
+              <a:t>Results</a:t>
+            </a:r>
+          </a:p>
+        </p:txBody>
+      </p:sp>
+      <p:sp>
+        <p:nvSpPr>
+          <p:cNvPr id="23" name="TextBox 22">
+            <a:extLst>
+              <a:ext uri="{FF2B5EF4-FFF2-40B4-BE49-F238E27FC236}">
+                <a16:creationId xmlns:a16="http://schemas.microsoft.com/office/drawing/2014/main" id="{45F76489-AC6A-D4E3-2550-970E38CA02C9}"/>
+              </a:ext>
+            </a:extLst>
+          </p:cNvPr>
+          <p:cNvSpPr txBox="1"/>
+          <p:nvPr/>
+        </p:nvSpPr>
+        <p:spPr>
+          <a:xfrm>
+            <a:off x="493677" y="1194114"/>
+            <a:ext cx="2376250" cy="646331"/>
+          </a:xfrm>
+          <a:prstGeom prst="rect">
+            <a:avLst/>
+          </a:prstGeom>
+          <a:noFill/>
+        </p:spPr>
+        <p:txBody>
+          <a:bodyPr wrap="square" rtlCol="0">
+            <a:spAutoFit/>
+          </a:bodyPr>
+          <a:lstStyle/>
+          <a:p>
+            <a:r>
+              <a:rPr lang="en-US" i="1" dirty="0">
+                <a:solidFill>
+                  <a:schemeClr val="tx2">
+                    <a:lumMod val="75000"/>
+                    <a:lumOff val="25000"/>
+                  </a:schemeClr>
+                </a:solidFill>
+              </a:rPr>
+              <a:t>Business </a:t>
+            </a:r>
+            <a:br>
+              <a:rPr lang="en-US" i="1" dirty="0">
+                <a:solidFill>
+                  <a:schemeClr val="tx2">
+                    <a:lumMod val="75000"/>
+                    <a:lumOff val="25000"/>
+                  </a:schemeClr>
+                </a:solidFill>
+              </a:rPr>
+            </a:br>
+            <a:r>
+              <a:rPr lang="en-US" i="1" dirty="0">
+                <a:solidFill>
+                  <a:schemeClr val="tx2">
+                    <a:lumMod val="75000"/>
+                    <a:lumOff val="25000"/>
+                  </a:schemeClr>
+                </a:solidFill>
+              </a:rPr>
+              <a:t>Principles</a:t>
+            </a:r>
+          </a:p>
+        </p:txBody>
+      </p:sp>
+      <p:sp>
+        <p:nvSpPr>
+          <p:cNvPr id="24" name="TextBox 23">
+            <a:extLst>
+              <a:ext uri="{FF2B5EF4-FFF2-40B4-BE49-F238E27FC236}">
+                <a16:creationId xmlns:a16="http://schemas.microsoft.com/office/drawing/2014/main" id="{168EDF34-AEFD-2B83-B3AA-D12A935EF18D}"/>
+              </a:ext>
+            </a:extLst>
+          </p:cNvPr>
+          <p:cNvSpPr txBox="1"/>
+          <p:nvPr/>
+        </p:nvSpPr>
+        <p:spPr>
+          <a:xfrm>
+            <a:off x="7028375" y="1194114"/>
+            <a:ext cx="1416673" cy="646331"/>
+          </a:xfrm>
+          <a:prstGeom prst="rect">
+            <a:avLst/>
+          </a:prstGeom>
+          <a:noFill/>
+        </p:spPr>
+        <p:txBody>
+          <a:bodyPr wrap="square" rtlCol="0">
+            <a:spAutoFit/>
+          </a:bodyPr>
+          <a:lstStyle/>
+          <a:p>
+            <a:pPr algn="r"/>
+            <a:r>
+              <a:rPr lang="en-US" i="1" dirty="0">
+                <a:solidFill>
+                  <a:schemeClr val="accent2">
+                    <a:lumMod val="75000"/>
+                  </a:schemeClr>
+                </a:solidFill>
+              </a:rPr>
+              <a:t>Technical </a:t>
+            </a:r>
+            <a:br>
+              <a:rPr lang="en-US" i="1" dirty="0">
+                <a:solidFill>
+                  <a:schemeClr val="accent2">
+                    <a:lumMod val="75000"/>
+                  </a:schemeClr>
+                </a:solidFill>
+              </a:rPr>
+            </a:br>
+            <a:r>
+              <a:rPr lang="en-US" i="1" dirty="0">
+                <a:solidFill>
+                  <a:schemeClr val="accent2">
+                    <a:lumMod val="75000"/>
+                  </a:schemeClr>
+                </a:solidFill>
+              </a:rPr>
+              <a:t>Capability</a:t>
+            </a:r>
+          </a:p>
+        </p:txBody>
+      </p:sp>
+      <p:sp>
+        <p:nvSpPr>
+          <p:cNvPr id="28" name="TextBox 27">
+            <a:extLst>
+              <a:ext uri="{FF2B5EF4-FFF2-40B4-BE49-F238E27FC236}">
+                <a16:creationId xmlns:a16="http://schemas.microsoft.com/office/drawing/2014/main" id="{B1659710-C4CA-B6B6-E79D-46BE56C1AE1C}"/>
+              </a:ext>
+            </a:extLst>
+          </p:cNvPr>
+          <p:cNvSpPr txBox="1"/>
+          <p:nvPr/>
+        </p:nvSpPr>
+        <p:spPr>
+          <a:xfrm>
+            <a:off x="2555776" y="431469"/>
+            <a:ext cx="4572000" cy="830997"/>
+          </a:xfrm>
+          <a:prstGeom prst="rect">
+            <a:avLst/>
+          </a:prstGeom>
+          <a:noFill/>
+        </p:spPr>
+        <p:txBody>
+          <a:bodyPr wrap="square">
+            <a:spAutoFit/>
+          </a:bodyPr>
+          <a:lstStyle/>
+          <a:p>
+            <a:r>
+              <a:rPr kumimoji="0" lang="en-US" sz="4800" i="0" u="none" strike="noStrike" kern="1200" cap="none" spc="0" normalizeH="0" baseline="0" noProof="0" dirty="0">
+                <a:ln>
+                  <a:noFill/>
+                </a:ln>
+                <a:solidFill>
+                  <a:srgbClr val="000000"/>
+                </a:solidFill>
+                <a:effectLst/>
+                <a:uLnTx/>
+                <a:uFillTx/>
+                <a:latin typeface="Aptos" panose="020B0004020202020204" pitchFamily="34" charset="0"/>
+                <a:ea typeface="+mn-ea"/>
+                <a:cs typeface="+mn-cs"/>
+              </a:rPr>
+              <a:t>The “US-PCS”</a:t>
+            </a:r>
+            <a:endParaRPr lang="en-US" dirty="0"/>
+          </a:p>
+        </p:txBody>
+      </p:sp>
+      <p:sp>
+        <p:nvSpPr>
+          <p:cNvPr id="29" name="Arrow: Bent 28">
+            <a:extLst>
+              <a:ext uri="{FF2B5EF4-FFF2-40B4-BE49-F238E27FC236}">
+                <a16:creationId xmlns:a16="http://schemas.microsoft.com/office/drawing/2014/main" id="{7169D460-E512-56FB-0D57-9524721F5688}"/>
+              </a:ext>
+            </a:extLst>
+          </p:cNvPr>
+          <p:cNvSpPr/>
+          <p:nvPr/>
+        </p:nvSpPr>
+        <p:spPr>
+          <a:xfrm rot="5400000">
+            <a:off x="6256940" y="835849"/>
+            <a:ext cx="1008111" cy="774912"/>
+          </a:xfrm>
+          <a:prstGeom prst="bentArrow">
+            <a:avLst/>
+          </a:prstGeom>
+          <a:solidFill>
+            <a:schemeClr val="accent2">
+              <a:lumMod val="20000"/>
+              <a:lumOff val="80000"/>
+            </a:schemeClr>
+          </a:solidFill>
+          <a:ln>
+            <a:solidFill>
+              <a:schemeClr val="accent2">
+                <a:lumMod val="75000"/>
+              </a:schemeClr>
+            </a:solidFill>
+          </a:ln>
+        </p:spPr>
+        <p:style>
+          <a:lnRef idx="2">
+            <a:schemeClr val="accent1">
+              <a:shade val="15000"/>
+            </a:schemeClr>
+          </a:lnRef>
+          <a:fillRef idx="1">
+            <a:schemeClr val="accent1"/>
+          </a:fillRef>
+          <a:effectRef idx="0">
+            <a:schemeClr val="accent1"/>
+          </a:effectRef>
+          <a:fontRef idx="minor">
+            <a:schemeClr val="lt1"/>
+          </a:fontRef>
+        </p:style>
+        <p:txBody>
+          <a:bodyPr rtlCol="0" anchor="ctr"/>
+          <a:lstStyle/>
+          <a:p>
+            <a:pPr algn="ctr"/>
+            <a:endParaRPr lang="en-US"/>
+          </a:p>
+        </p:txBody>
+      </p:sp>
+      <p:sp>
+        <p:nvSpPr>
+          <p:cNvPr id="30" name="Arrow: Bent 29">
+            <a:extLst>
+              <a:ext uri="{FF2B5EF4-FFF2-40B4-BE49-F238E27FC236}">
+                <a16:creationId xmlns:a16="http://schemas.microsoft.com/office/drawing/2014/main" id="{E7A9F9D2-6155-7BB1-A393-1A01AD09292E}"/>
+              </a:ext>
+            </a:extLst>
+          </p:cNvPr>
+          <p:cNvSpPr/>
+          <p:nvPr/>
+        </p:nvSpPr>
+        <p:spPr>
+          <a:xfrm rot="5400000" flipV="1">
+            <a:off x="1584003" y="846187"/>
+            <a:ext cx="1008111" cy="754236"/>
+          </a:xfrm>
+          <a:prstGeom prst="bentArrow">
+            <a:avLst/>
+          </a:prstGeom>
+          <a:solidFill>
+            <a:schemeClr val="tx2">
+              <a:lumMod val="10000"/>
+              <a:lumOff val="90000"/>
+            </a:schemeClr>
+          </a:solidFill>
+          <a:ln>
+            <a:solidFill>
+              <a:schemeClr val="tx2">
+                <a:lumMod val="75000"/>
+                <a:lumOff val="25000"/>
+              </a:schemeClr>
+            </a:solidFill>
+          </a:ln>
+        </p:spPr>
+        <p:style>
+          <a:lnRef idx="2">
+            <a:schemeClr val="accent1">
+              <a:shade val="15000"/>
+            </a:schemeClr>
+          </a:lnRef>
+          <a:fillRef idx="1">
+            <a:schemeClr val="accent1"/>
+          </a:fillRef>
+          <a:effectRef idx="0">
+            <a:schemeClr val="accent1"/>
+          </a:effectRef>
+          <a:fontRef idx="minor">
+            <a:schemeClr val="lt1"/>
+          </a:fontRef>
+        </p:style>
+        <p:txBody>
+          <a:bodyPr rtlCol="0" anchor="ctr"/>
+          <a:lstStyle/>
+          <a:p>
+            <a:pPr algn="ctr"/>
+            <a:endParaRPr lang="en-US"/>
+          </a:p>
+        </p:txBody>
+      </p:sp>
+      <p:sp>
+        <p:nvSpPr>
+          <p:cNvPr id="33" name="Cylinder 32">
+            <a:extLst>
+              <a:ext uri="{FF2B5EF4-FFF2-40B4-BE49-F238E27FC236}">
+                <a16:creationId xmlns:a16="http://schemas.microsoft.com/office/drawing/2014/main" id="{66716741-6FE0-11F8-A485-D21578EF6864}"/>
+              </a:ext>
+            </a:extLst>
+          </p:cNvPr>
+          <p:cNvSpPr/>
+          <p:nvPr/>
+        </p:nvSpPr>
+        <p:spPr>
+          <a:xfrm>
+            <a:off x="8045463" y="4225524"/>
+            <a:ext cx="607329" cy="234077"/>
+          </a:xfrm>
+          <a:prstGeom prst="can">
+            <a:avLst/>
+          </a:prstGeom>
+          <a:solidFill>
+            <a:schemeClr val="accent2">
+              <a:lumMod val="20000"/>
+              <a:lumOff val="80000"/>
+            </a:schemeClr>
+          </a:solidFill>
+          <a:ln w="28575">
+            <a:solidFill>
+              <a:schemeClr val="tx1">
+                <a:lumMod val="75000"/>
+                <a:lumOff val="25000"/>
+              </a:schemeClr>
+            </a:solidFill>
+          </a:ln>
+        </p:spPr>
+        <p:style>
+          <a:lnRef idx="2">
+            <a:schemeClr val="accent1">
+              <a:shade val="15000"/>
+            </a:schemeClr>
+          </a:lnRef>
+          <a:fillRef idx="1">
+            <a:schemeClr val="accent1"/>
+          </a:fillRef>
+          <a:effectRef idx="0">
+            <a:schemeClr val="accent1"/>
+          </a:effectRef>
+          <a:fontRef idx="minor">
+            <a:schemeClr val="lt1"/>
+          </a:fontRef>
+        </p:style>
+        <p:txBody>
+          <a:bodyPr rtlCol="0" anchor="ctr"/>
+          <a:lstStyle/>
+          <a:p>
+            <a:pPr algn="ctr"/>
+            <a:endParaRPr lang="en-US" dirty="0"/>
+          </a:p>
+        </p:txBody>
+      </p:sp>
+      <p:sp>
+        <p:nvSpPr>
+          <p:cNvPr id="34" name="Cylinder 33">
+            <a:extLst>
+              <a:ext uri="{FF2B5EF4-FFF2-40B4-BE49-F238E27FC236}">
+                <a16:creationId xmlns:a16="http://schemas.microsoft.com/office/drawing/2014/main" id="{29431E6E-6E1A-56A0-B20F-F053AB101DDA}"/>
+              </a:ext>
+            </a:extLst>
+          </p:cNvPr>
+          <p:cNvSpPr/>
+          <p:nvPr/>
+        </p:nvSpPr>
+        <p:spPr>
+          <a:xfrm>
+            <a:off x="8045463" y="4006077"/>
+            <a:ext cx="607329" cy="234077"/>
+          </a:xfrm>
+          <a:prstGeom prst="can">
+            <a:avLst/>
+          </a:prstGeom>
+          <a:solidFill>
+            <a:schemeClr val="accent2">
+              <a:lumMod val="20000"/>
+              <a:lumOff val="80000"/>
+            </a:schemeClr>
+          </a:solidFill>
+          <a:ln w="28575">
+            <a:solidFill>
+              <a:schemeClr val="tx1">
+                <a:lumMod val="75000"/>
+                <a:lumOff val="25000"/>
+              </a:schemeClr>
+            </a:solidFill>
+          </a:ln>
+        </p:spPr>
+        <p:style>
+          <a:lnRef idx="2">
+            <a:schemeClr val="accent1">
+              <a:shade val="15000"/>
+            </a:schemeClr>
+          </a:lnRef>
+          <a:fillRef idx="1">
+            <a:schemeClr val="accent1"/>
+          </a:fillRef>
+          <a:effectRef idx="0">
+            <a:schemeClr val="accent1"/>
+          </a:effectRef>
+          <a:fontRef idx="minor">
+            <a:schemeClr val="lt1"/>
+          </a:fontRef>
+        </p:style>
+        <p:txBody>
+          <a:bodyPr rtlCol="0" anchor="ctr"/>
+          <a:lstStyle/>
+          <a:p>
+            <a:pPr algn="ctr"/>
+            <a:endParaRPr lang="en-US" dirty="0"/>
+          </a:p>
+        </p:txBody>
+      </p:sp>
+      <p:sp>
+        <p:nvSpPr>
+          <p:cNvPr id="35" name="Cylinder 34">
+            <a:extLst>
+              <a:ext uri="{FF2B5EF4-FFF2-40B4-BE49-F238E27FC236}">
+                <a16:creationId xmlns:a16="http://schemas.microsoft.com/office/drawing/2014/main" id="{B2FD8B3C-3107-A405-6865-9B770FD85B51}"/>
+              </a:ext>
+            </a:extLst>
+          </p:cNvPr>
+          <p:cNvSpPr/>
+          <p:nvPr/>
+        </p:nvSpPr>
+        <p:spPr>
+          <a:xfrm>
+            <a:off x="8045463" y="3786629"/>
+            <a:ext cx="607329" cy="234077"/>
+          </a:xfrm>
+          <a:prstGeom prst="can">
+            <a:avLst/>
+          </a:prstGeom>
+          <a:solidFill>
+            <a:schemeClr val="accent2">
+              <a:lumMod val="20000"/>
+              <a:lumOff val="80000"/>
+            </a:schemeClr>
+          </a:solidFill>
+          <a:ln w="28575">
+            <a:solidFill>
+              <a:schemeClr val="tx1">
+                <a:lumMod val="75000"/>
+                <a:lumOff val="25000"/>
+              </a:schemeClr>
+            </a:solidFill>
+          </a:ln>
+        </p:spPr>
+        <p:style>
+          <a:lnRef idx="2">
+            <a:schemeClr val="accent1">
+              <a:shade val="15000"/>
+            </a:schemeClr>
+          </a:lnRef>
+          <a:fillRef idx="1">
+            <a:schemeClr val="accent1"/>
+          </a:fillRef>
+          <a:effectRef idx="0">
+            <a:schemeClr val="accent1"/>
+          </a:effectRef>
+          <a:fontRef idx="minor">
+            <a:schemeClr val="lt1"/>
+          </a:fontRef>
+        </p:style>
+        <p:txBody>
+          <a:bodyPr rtlCol="0" anchor="ctr"/>
+          <a:lstStyle/>
+          <a:p>
+            <a:pPr algn="ctr"/>
+            <a:endParaRPr lang="en-US" dirty="0"/>
+          </a:p>
+        </p:txBody>
+      </p:sp>
+      <p:pic>
+        <p:nvPicPr>
+          <p:cNvPr id="48" name="Picture 2" descr="logo fhir">
+            <a:extLst>
+              <a:ext uri="{FF2B5EF4-FFF2-40B4-BE49-F238E27FC236}">
+                <a16:creationId xmlns:a16="http://schemas.microsoft.com/office/drawing/2014/main" id="{3148ACF8-DD03-E429-47DC-74E3125CB456}"/>
+              </a:ext>
+            </a:extLst>
+          </p:cNvPr>
+          <p:cNvPicPr>
+            <a:picLocks noChangeAspect="1" noChangeArrowheads="1"/>
+          </p:cNvPicPr>
+          <p:nvPr/>
+        </p:nvPicPr>
+        <p:blipFill rotWithShape="1">
+          <a:blip r:embed="rId3" cstate="print">
+            <a:extLst>
+              <a:ext uri="{28A0092B-C50C-407E-A947-70E740481C1C}">
+                <a14:useLocalDpi xmlns:a14="http://schemas.microsoft.com/office/drawing/2010/main" val="0"/>
+              </a:ext>
+            </a:extLst>
+          </a:blip>
+          <a:srcRect r="83546"/>
+          <a:stretch>
+            <a:fillRect/>
+          </a:stretch>
+        </p:blipFill>
+        <p:spPr bwMode="auto">
+          <a:xfrm>
+            <a:off x="8534139" y="3493358"/>
+            <a:ext cx="350236" cy="512756"/>
+          </a:xfrm>
+          <a:prstGeom prst="rect">
+            <a:avLst/>
+          </a:prstGeom>
+          <a:noFill/>
+          <a:extLst>
+            <a:ext uri="{909E8E84-426E-40DD-AFC4-6F175D3DCCD1}">
+              <a14:hiddenFill xmlns:a14="http://schemas.microsoft.com/office/drawing/2010/main">
+                <a:solidFill>
+                  <a:srgbClr val="FFFFFF"/>
+                </a:solidFill>
+              </a14:hiddenFill>
+            </a:ext>
+          </a:extLst>
+        </p:spPr>
+      </p:pic>
+    </p:spTree>
+    <p:extLst>
+      <p:ext uri="{BB962C8B-B14F-4D97-AF65-F5344CB8AC3E}">
+        <p14:creationId xmlns:p14="http://schemas.microsoft.com/office/powerpoint/2010/main" val="2694893193"/>
       </p:ext>
     </p:extLst>
   </p:cSld>

</xml_diff>